<commit_message>
updated ppt with updated data
</commit_message>
<xml_diff>
--- a/Case Study for Cyclistic.pptx
+++ b/Case Study for Cyclistic.pptx
@@ -4,6 +4,9 @@
   <p:sldMasterIdLst>
     <p:sldMasterId id="2147483648" r:id="rId1"/>
   </p:sldMasterIdLst>
+  <p:notesMasterIdLst>
+    <p:notesMasterId r:id="rId12"/>
+  </p:notesMasterIdLst>
   <p:sldIdLst>
     <p:sldId id="256" r:id="rId2"/>
     <p:sldId id="257" r:id="rId3"/>
@@ -119,6 +122,439 @@
     </p:ext>
   </p:extLst>
 </p:presentation>
+</file>
+
+<file path=ppt/notesMasters/notesMaster1.xml><?xml version="1.0" encoding="utf-8"?>
+<p:notesMaster xmlns:a="http://schemas.openxmlformats.org/drawingml/2006/main" xmlns:r="http://schemas.openxmlformats.org/officeDocument/2006/relationships" xmlns:p="http://schemas.openxmlformats.org/presentationml/2006/main">
+  <p:cSld>
+    <p:bg>
+      <p:bgRef idx="1001">
+        <a:schemeClr val="bg1"/>
+      </p:bgRef>
+    </p:bg>
+    <p:spTree>
+      <p:nvGrpSpPr>
+        <p:cNvPr id="1" name=""/>
+        <p:cNvGrpSpPr/>
+        <p:nvPr/>
+      </p:nvGrpSpPr>
+      <p:grpSpPr>
+        <a:xfrm>
+          <a:off x="0" y="0"/>
+          <a:ext cx="0" cy="0"/>
+          <a:chOff x="0" y="0"/>
+          <a:chExt cx="0" cy="0"/>
+        </a:xfrm>
+      </p:grpSpPr>
+      <p:sp>
+        <p:nvSpPr>
+          <p:cNvPr id="2" name="Header Placeholder 1"/>
+          <p:cNvSpPr>
+            <a:spLocks noGrp="1"/>
+          </p:cNvSpPr>
+          <p:nvPr>
+            <p:ph type="hdr" sz="quarter"/>
+          </p:nvPr>
+        </p:nvSpPr>
+        <p:spPr>
+          <a:xfrm>
+            <a:off x="0" y="0"/>
+            <a:ext cx="2971800" cy="458788"/>
+          </a:xfrm>
+          <a:prstGeom prst="rect">
+            <a:avLst/>
+          </a:prstGeom>
+        </p:spPr>
+        <p:txBody>
+          <a:bodyPr vert="horz" lIns="91440" tIns="45720" rIns="91440" bIns="45720" rtlCol="0"/>
+          <a:lstStyle>
+            <a:lvl1pPr algn="l">
+              <a:defRPr sz="1200"/>
+            </a:lvl1pPr>
+          </a:lstStyle>
+          <a:p>
+            <a:endParaRPr lang="en-US"/>
+          </a:p>
+        </p:txBody>
+      </p:sp>
+      <p:sp>
+        <p:nvSpPr>
+          <p:cNvPr id="3" name="Date Placeholder 2"/>
+          <p:cNvSpPr>
+            <a:spLocks noGrp="1"/>
+          </p:cNvSpPr>
+          <p:nvPr>
+            <p:ph type="dt" idx="1"/>
+          </p:nvPr>
+        </p:nvSpPr>
+        <p:spPr>
+          <a:xfrm>
+            <a:off x="3884613" y="0"/>
+            <a:ext cx="2971800" cy="458788"/>
+          </a:xfrm>
+          <a:prstGeom prst="rect">
+            <a:avLst/>
+          </a:prstGeom>
+        </p:spPr>
+        <p:txBody>
+          <a:bodyPr vert="horz" lIns="91440" tIns="45720" rIns="91440" bIns="45720" rtlCol="0"/>
+          <a:lstStyle>
+            <a:lvl1pPr algn="r">
+              <a:defRPr sz="1200"/>
+            </a:lvl1pPr>
+          </a:lstStyle>
+          <a:p>
+            <a:fld id="{720C8D81-C60F-490F-A095-00E127F6CCB9}" type="datetimeFigureOut">
+              <a:rPr lang="en-US" smtClean="0"/>
+              <a:t>8/23/2021</a:t>
+            </a:fld>
+            <a:endParaRPr lang="en-US"/>
+          </a:p>
+        </p:txBody>
+      </p:sp>
+      <p:sp>
+        <p:nvSpPr>
+          <p:cNvPr id="4" name="Slide Image Placeholder 3"/>
+          <p:cNvSpPr>
+            <a:spLocks noGrp="1" noRot="1" noChangeAspect="1"/>
+          </p:cNvSpPr>
+          <p:nvPr>
+            <p:ph type="sldImg" idx="2"/>
+          </p:nvPr>
+        </p:nvSpPr>
+        <p:spPr>
+          <a:xfrm>
+            <a:off x="685800" y="1143000"/>
+            <a:ext cx="5486400" cy="3086100"/>
+          </a:xfrm>
+          <a:prstGeom prst="rect">
+            <a:avLst/>
+          </a:prstGeom>
+          <a:noFill/>
+          <a:ln w="12700">
+            <a:solidFill>
+              <a:prstClr val="black"/>
+            </a:solidFill>
+          </a:ln>
+        </p:spPr>
+        <p:txBody>
+          <a:bodyPr vert="horz" lIns="91440" tIns="45720" rIns="91440" bIns="45720" rtlCol="0" anchor="ctr"/>
+          <a:lstStyle/>
+          <a:p>
+            <a:endParaRPr lang="en-US"/>
+          </a:p>
+        </p:txBody>
+      </p:sp>
+      <p:sp>
+        <p:nvSpPr>
+          <p:cNvPr id="5" name="Notes Placeholder 4"/>
+          <p:cNvSpPr>
+            <a:spLocks noGrp="1"/>
+          </p:cNvSpPr>
+          <p:nvPr>
+            <p:ph type="body" sz="quarter" idx="3"/>
+          </p:nvPr>
+        </p:nvSpPr>
+        <p:spPr>
+          <a:xfrm>
+            <a:off x="685800" y="4400550"/>
+            <a:ext cx="5486400" cy="3600450"/>
+          </a:xfrm>
+          <a:prstGeom prst="rect">
+            <a:avLst/>
+          </a:prstGeom>
+        </p:spPr>
+        <p:txBody>
+          <a:bodyPr vert="horz" lIns="91440" tIns="45720" rIns="91440" bIns="45720" rtlCol="0"/>
+          <a:lstStyle/>
+          <a:p>
+            <a:pPr lvl="0"/>
+            <a:r>
+              <a:rPr lang="en-US"/>
+              <a:t>Click to edit Master text styles</a:t>
+            </a:r>
+          </a:p>
+          <a:p>
+            <a:pPr lvl="1"/>
+            <a:r>
+              <a:rPr lang="en-US"/>
+              <a:t>Second level</a:t>
+            </a:r>
+          </a:p>
+          <a:p>
+            <a:pPr lvl="2"/>
+            <a:r>
+              <a:rPr lang="en-US"/>
+              <a:t>Third level</a:t>
+            </a:r>
+          </a:p>
+          <a:p>
+            <a:pPr lvl="3"/>
+            <a:r>
+              <a:rPr lang="en-US"/>
+              <a:t>Fourth level</a:t>
+            </a:r>
+          </a:p>
+          <a:p>
+            <a:pPr lvl="4"/>
+            <a:r>
+              <a:rPr lang="en-US"/>
+              <a:t>Fifth level</a:t>
+            </a:r>
+          </a:p>
+        </p:txBody>
+      </p:sp>
+      <p:sp>
+        <p:nvSpPr>
+          <p:cNvPr id="6" name="Footer Placeholder 5"/>
+          <p:cNvSpPr>
+            <a:spLocks noGrp="1"/>
+          </p:cNvSpPr>
+          <p:nvPr>
+            <p:ph type="ftr" sz="quarter" idx="4"/>
+          </p:nvPr>
+        </p:nvSpPr>
+        <p:spPr>
+          <a:xfrm>
+            <a:off x="0" y="8685213"/>
+            <a:ext cx="2971800" cy="458787"/>
+          </a:xfrm>
+          <a:prstGeom prst="rect">
+            <a:avLst/>
+          </a:prstGeom>
+        </p:spPr>
+        <p:txBody>
+          <a:bodyPr vert="horz" lIns="91440" tIns="45720" rIns="91440" bIns="45720" rtlCol="0" anchor="b"/>
+          <a:lstStyle>
+            <a:lvl1pPr algn="l">
+              <a:defRPr sz="1200"/>
+            </a:lvl1pPr>
+          </a:lstStyle>
+          <a:p>
+            <a:endParaRPr lang="en-US"/>
+          </a:p>
+        </p:txBody>
+      </p:sp>
+      <p:sp>
+        <p:nvSpPr>
+          <p:cNvPr id="7" name="Slide Number Placeholder 6"/>
+          <p:cNvSpPr>
+            <a:spLocks noGrp="1"/>
+          </p:cNvSpPr>
+          <p:nvPr>
+            <p:ph type="sldNum" sz="quarter" idx="5"/>
+          </p:nvPr>
+        </p:nvSpPr>
+        <p:spPr>
+          <a:xfrm>
+            <a:off x="3884613" y="8685213"/>
+            <a:ext cx="2971800" cy="458787"/>
+          </a:xfrm>
+          <a:prstGeom prst="rect">
+            <a:avLst/>
+          </a:prstGeom>
+        </p:spPr>
+        <p:txBody>
+          <a:bodyPr vert="horz" lIns="91440" tIns="45720" rIns="91440" bIns="45720" rtlCol="0" anchor="b"/>
+          <a:lstStyle>
+            <a:lvl1pPr algn="r">
+              <a:defRPr sz="1200"/>
+            </a:lvl1pPr>
+          </a:lstStyle>
+          <a:p>
+            <a:fld id="{77A62B99-7964-46F4-9A94-7E20F2C2E4FB}" type="slidenum">
+              <a:rPr lang="en-US" smtClean="0"/>
+              <a:t>‹#›</a:t>
+            </a:fld>
+            <a:endParaRPr lang="en-US"/>
+          </a:p>
+        </p:txBody>
+      </p:sp>
+    </p:spTree>
+    <p:extLst>
+      <p:ext uri="{BB962C8B-B14F-4D97-AF65-F5344CB8AC3E}">
+        <p14:creationId xmlns:p14="http://schemas.microsoft.com/office/powerpoint/2010/main" val="3240997807"/>
+      </p:ext>
+    </p:extLst>
+  </p:cSld>
+  <p:clrMap bg1="lt1" tx1="dk1" bg2="lt2" tx2="dk2" accent1="accent1" accent2="accent2" accent3="accent3" accent4="accent4" accent5="accent5" accent6="accent6" hlink="hlink" folHlink="folHlink"/>
+  <p:notesStyle>
+    <a:lvl1pPr marL="0" algn="l" defTabSz="914400" rtl="0" eaLnBrk="1" latinLnBrk="0" hangingPunct="1">
+      <a:defRPr sz="1200" kern="1200">
+        <a:solidFill>
+          <a:schemeClr val="tx1"/>
+        </a:solidFill>
+        <a:latin typeface="+mn-lt"/>
+        <a:ea typeface="+mn-ea"/>
+        <a:cs typeface="+mn-cs"/>
+      </a:defRPr>
+    </a:lvl1pPr>
+    <a:lvl2pPr marL="457200" algn="l" defTabSz="914400" rtl="0" eaLnBrk="1" latinLnBrk="0" hangingPunct="1">
+      <a:defRPr sz="1200" kern="1200">
+        <a:solidFill>
+          <a:schemeClr val="tx1"/>
+        </a:solidFill>
+        <a:latin typeface="+mn-lt"/>
+        <a:ea typeface="+mn-ea"/>
+        <a:cs typeface="+mn-cs"/>
+      </a:defRPr>
+    </a:lvl2pPr>
+    <a:lvl3pPr marL="914400" algn="l" defTabSz="914400" rtl="0" eaLnBrk="1" latinLnBrk="0" hangingPunct="1">
+      <a:defRPr sz="1200" kern="1200">
+        <a:solidFill>
+          <a:schemeClr val="tx1"/>
+        </a:solidFill>
+        <a:latin typeface="+mn-lt"/>
+        <a:ea typeface="+mn-ea"/>
+        <a:cs typeface="+mn-cs"/>
+      </a:defRPr>
+    </a:lvl3pPr>
+    <a:lvl4pPr marL="1371600" algn="l" defTabSz="914400" rtl="0" eaLnBrk="1" latinLnBrk="0" hangingPunct="1">
+      <a:defRPr sz="1200" kern="1200">
+        <a:solidFill>
+          <a:schemeClr val="tx1"/>
+        </a:solidFill>
+        <a:latin typeface="+mn-lt"/>
+        <a:ea typeface="+mn-ea"/>
+        <a:cs typeface="+mn-cs"/>
+      </a:defRPr>
+    </a:lvl4pPr>
+    <a:lvl5pPr marL="1828800" algn="l" defTabSz="914400" rtl="0" eaLnBrk="1" latinLnBrk="0" hangingPunct="1">
+      <a:defRPr sz="1200" kern="1200">
+        <a:solidFill>
+          <a:schemeClr val="tx1"/>
+        </a:solidFill>
+        <a:latin typeface="+mn-lt"/>
+        <a:ea typeface="+mn-ea"/>
+        <a:cs typeface="+mn-cs"/>
+      </a:defRPr>
+    </a:lvl5pPr>
+    <a:lvl6pPr marL="2286000" algn="l" defTabSz="914400" rtl="0" eaLnBrk="1" latinLnBrk="0" hangingPunct="1">
+      <a:defRPr sz="1200" kern="1200">
+        <a:solidFill>
+          <a:schemeClr val="tx1"/>
+        </a:solidFill>
+        <a:latin typeface="+mn-lt"/>
+        <a:ea typeface="+mn-ea"/>
+        <a:cs typeface="+mn-cs"/>
+      </a:defRPr>
+    </a:lvl6pPr>
+    <a:lvl7pPr marL="2743200" algn="l" defTabSz="914400" rtl="0" eaLnBrk="1" latinLnBrk="0" hangingPunct="1">
+      <a:defRPr sz="1200" kern="1200">
+        <a:solidFill>
+          <a:schemeClr val="tx1"/>
+        </a:solidFill>
+        <a:latin typeface="+mn-lt"/>
+        <a:ea typeface="+mn-ea"/>
+        <a:cs typeface="+mn-cs"/>
+      </a:defRPr>
+    </a:lvl7pPr>
+    <a:lvl8pPr marL="3200400" algn="l" defTabSz="914400" rtl="0" eaLnBrk="1" latinLnBrk="0" hangingPunct="1">
+      <a:defRPr sz="1200" kern="1200">
+        <a:solidFill>
+          <a:schemeClr val="tx1"/>
+        </a:solidFill>
+        <a:latin typeface="+mn-lt"/>
+        <a:ea typeface="+mn-ea"/>
+        <a:cs typeface="+mn-cs"/>
+      </a:defRPr>
+    </a:lvl8pPr>
+    <a:lvl9pPr marL="3657600" algn="l" defTabSz="914400" rtl="0" eaLnBrk="1" latinLnBrk="0" hangingPunct="1">
+      <a:defRPr sz="1200" kern="1200">
+        <a:solidFill>
+          <a:schemeClr val="tx1"/>
+        </a:solidFill>
+        <a:latin typeface="+mn-lt"/>
+        <a:ea typeface="+mn-ea"/>
+        <a:cs typeface="+mn-cs"/>
+      </a:defRPr>
+    </a:lvl9pPr>
+  </p:notesStyle>
+</p:notesMaster>
+</file>
+
+<file path=ppt/notesSlides/notesSlide1.xml><?xml version="1.0" encoding="utf-8"?>
+<p:notes xmlns:a="http://schemas.openxmlformats.org/drawingml/2006/main" xmlns:r="http://schemas.openxmlformats.org/officeDocument/2006/relationships" xmlns:p="http://schemas.openxmlformats.org/presentationml/2006/main">
+  <p:cSld>
+    <p:spTree>
+      <p:nvGrpSpPr>
+        <p:cNvPr id="1" name=""/>
+        <p:cNvGrpSpPr/>
+        <p:nvPr/>
+      </p:nvGrpSpPr>
+      <p:grpSpPr>
+        <a:xfrm>
+          <a:off x="0" y="0"/>
+          <a:ext cx="0" cy="0"/>
+          <a:chOff x="0" y="0"/>
+          <a:chExt cx="0" cy="0"/>
+        </a:xfrm>
+      </p:grpSpPr>
+      <p:sp>
+        <p:nvSpPr>
+          <p:cNvPr id="2" name="Slide Image Placeholder 1"/>
+          <p:cNvSpPr>
+            <a:spLocks noGrp="1" noRot="1" noChangeAspect="1"/>
+          </p:cNvSpPr>
+          <p:nvPr>
+            <p:ph type="sldImg"/>
+          </p:nvPr>
+        </p:nvSpPr>
+        <p:spPr/>
+      </p:sp>
+      <p:sp>
+        <p:nvSpPr>
+          <p:cNvPr id="3" name="Notes Placeholder 2"/>
+          <p:cNvSpPr>
+            <a:spLocks noGrp="1"/>
+          </p:cNvSpPr>
+          <p:nvPr>
+            <p:ph type="body" idx="1"/>
+          </p:nvPr>
+        </p:nvSpPr>
+        <p:spPr/>
+        <p:txBody>
+          <a:bodyPr/>
+          <a:lstStyle/>
+          <a:p>
+            <a:endParaRPr lang="en-US" dirty="0"/>
+          </a:p>
+        </p:txBody>
+      </p:sp>
+      <p:sp>
+        <p:nvSpPr>
+          <p:cNvPr id="4" name="Slide Number Placeholder 3"/>
+          <p:cNvSpPr>
+            <a:spLocks noGrp="1"/>
+          </p:cNvSpPr>
+          <p:nvPr>
+            <p:ph type="sldNum" sz="quarter" idx="5"/>
+          </p:nvPr>
+        </p:nvSpPr>
+        <p:spPr/>
+        <p:txBody>
+          <a:bodyPr/>
+          <a:lstStyle/>
+          <a:p>
+            <a:fld id="{77A62B99-7964-46F4-9A94-7E20F2C2E4FB}" type="slidenum">
+              <a:rPr lang="en-US" smtClean="0"/>
+              <a:t>6</a:t>
+            </a:fld>
+            <a:endParaRPr lang="en-US"/>
+          </a:p>
+        </p:txBody>
+      </p:sp>
+    </p:spTree>
+    <p:extLst>
+      <p:ext uri="{BB962C8B-B14F-4D97-AF65-F5344CB8AC3E}">
+        <p14:creationId xmlns:p14="http://schemas.microsoft.com/office/powerpoint/2010/main" val="948925440"/>
+      </p:ext>
+    </p:extLst>
+  </p:cSld>
+  <p:clrMapOvr>
+    <a:masterClrMapping/>
+  </p:clrMapOvr>
+</p:notes>
 </file>
 
 <file path=ppt/slideLayouts/slideLayout1.xml><?xml version="1.0" encoding="utf-8"?>
@@ -268,7 +704,7 @@
           <a:p>
             <a:fld id="{A2DCA549-137D-472C-BCD6-A12B852F0C95}" type="datetimeFigureOut">
               <a:rPr lang="en-US" smtClean="0"/>
-              <a:t>7/21/2021</a:t>
+              <a:t>8/23/2021</a:t>
             </a:fld>
             <a:endParaRPr lang="en-US"/>
           </a:p>
@@ -466,7 +902,7 @@
           <a:p>
             <a:fld id="{A2DCA549-137D-472C-BCD6-A12B852F0C95}" type="datetimeFigureOut">
               <a:rPr lang="en-US" smtClean="0"/>
-              <a:t>7/21/2021</a:t>
+              <a:t>8/23/2021</a:t>
             </a:fld>
             <a:endParaRPr lang="en-US"/>
           </a:p>
@@ -674,7 +1110,7 @@
           <a:p>
             <a:fld id="{A2DCA549-137D-472C-BCD6-A12B852F0C95}" type="datetimeFigureOut">
               <a:rPr lang="en-US" smtClean="0"/>
-              <a:t>7/21/2021</a:t>
+              <a:t>8/23/2021</a:t>
             </a:fld>
             <a:endParaRPr lang="en-US"/>
           </a:p>
@@ -872,7 +1308,7 @@
           <a:p>
             <a:fld id="{A2DCA549-137D-472C-BCD6-A12B852F0C95}" type="datetimeFigureOut">
               <a:rPr lang="en-US" smtClean="0"/>
-              <a:t>7/21/2021</a:t>
+              <a:t>8/23/2021</a:t>
             </a:fld>
             <a:endParaRPr lang="en-US"/>
           </a:p>
@@ -1147,7 +1583,7 @@
           <a:p>
             <a:fld id="{A2DCA549-137D-472C-BCD6-A12B852F0C95}" type="datetimeFigureOut">
               <a:rPr lang="en-US" smtClean="0"/>
-              <a:t>7/21/2021</a:t>
+              <a:t>8/23/2021</a:t>
             </a:fld>
             <a:endParaRPr lang="en-US"/>
           </a:p>
@@ -1412,7 +1848,7 @@
           <a:p>
             <a:fld id="{A2DCA549-137D-472C-BCD6-A12B852F0C95}" type="datetimeFigureOut">
               <a:rPr lang="en-US" smtClean="0"/>
-              <a:t>7/21/2021</a:t>
+              <a:t>8/23/2021</a:t>
             </a:fld>
             <a:endParaRPr lang="en-US"/>
           </a:p>
@@ -1824,7 +2260,7 @@
           <a:p>
             <a:fld id="{A2DCA549-137D-472C-BCD6-A12B852F0C95}" type="datetimeFigureOut">
               <a:rPr lang="en-US" smtClean="0"/>
-              <a:t>7/21/2021</a:t>
+              <a:t>8/23/2021</a:t>
             </a:fld>
             <a:endParaRPr lang="en-US"/>
           </a:p>
@@ -1965,7 +2401,7 @@
           <a:p>
             <a:fld id="{A2DCA549-137D-472C-BCD6-A12B852F0C95}" type="datetimeFigureOut">
               <a:rPr lang="en-US" smtClean="0"/>
-              <a:t>7/21/2021</a:t>
+              <a:t>8/23/2021</a:t>
             </a:fld>
             <a:endParaRPr lang="en-US"/>
           </a:p>
@@ -2078,7 +2514,7 @@
           <a:p>
             <a:fld id="{A2DCA549-137D-472C-BCD6-A12B852F0C95}" type="datetimeFigureOut">
               <a:rPr lang="en-US" smtClean="0"/>
-              <a:t>7/21/2021</a:t>
+              <a:t>8/23/2021</a:t>
             </a:fld>
             <a:endParaRPr lang="en-US"/>
           </a:p>
@@ -2389,7 +2825,7 @@
           <a:p>
             <a:fld id="{A2DCA549-137D-472C-BCD6-A12B852F0C95}" type="datetimeFigureOut">
               <a:rPr lang="en-US" smtClean="0"/>
-              <a:t>7/21/2021</a:t>
+              <a:t>8/23/2021</a:t>
             </a:fld>
             <a:endParaRPr lang="en-US"/>
           </a:p>
@@ -2677,7 +3113,7 @@
           <a:p>
             <a:fld id="{A2DCA549-137D-472C-BCD6-A12B852F0C95}" type="datetimeFigureOut">
               <a:rPr lang="en-US" smtClean="0"/>
-              <a:t>7/21/2021</a:t>
+              <a:t>8/23/2021</a:t>
             </a:fld>
             <a:endParaRPr lang="en-US"/>
           </a:p>
@@ -2918,7 +3354,7 @@
           <a:p>
             <a:fld id="{A2DCA549-137D-472C-BCD6-A12B852F0C95}" type="datetimeFigureOut">
               <a:rPr lang="en-US" smtClean="0"/>
-              <a:t>7/21/2021</a:t>
+              <a:t>8/23/2021</a:t>
             </a:fld>
             <a:endParaRPr lang="en-US"/>
           </a:p>
@@ -6427,7 +6863,7 @@
                   </a:schemeClr>
                 </a:solidFill>
               </a:rPr>
-              <a:t>Further analysis will be needed regarding the last two problems.</a:t>
+              <a:t>Further analysis can be conducted such as why casual bikers choose docked bike</a:t>
             </a:r>
           </a:p>
           <a:p>
@@ -12238,8 +12674,8 @@
         </p:nvSpPr>
         <p:spPr>
           <a:xfrm>
-            <a:off x="1116498" y="655128"/>
-            <a:ext cx="4613919" cy="1499616"/>
+            <a:off x="815593" y="-360242"/>
+            <a:ext cx="3808960" cy="2325676"/>
           </a:xfrm>
           <a:prstGeom prst="rect">
             <a:avLst/>
@@ -12263,12 +12699,12 @@
               </a:spcAft>
             </a:pPr>
             <a:r>
-              <a:rPr lang="en-US" sz="4200">
+              <a:rPr lang="en-US" sz="4200" dirty="0">
                 <a:latin typeface="+mj-lt"/>
                 <a:ea typeface="+mj-ea"/>
                 <a:cs typeface="+mj-cs"/>
               </a:rPr>
-              <a:t>Day Distribution of a week</a:t>
+              <a:t>Day Distribution of a Week</a:t>
             </a:r>
           </a:p>
         </p:txBody>
@@ -13619,8 +14055,8 @@
         </p:blipFill>
         <p:spPr>
           <a:xfrm>
-            <a:off x="6479838" y="3963517"/>
-            <a:ext cx="5586942" cy="2410278"/>
+            <a:off x="6479838" y="3703335"/>
+            <a:ext cx="5586942" cy="2670460"/>
           </a:xfrm>
           <a:prstGeom prst="rect">
             <a:avLst/>
@@ -13692,10 +14128,10 @@
       </p:sp>
       <p:pic>
         <p:nvPicPr>
-          <p:cNvPr id="35" name="Picture 34" descr="Chart&#10;&#10;Description automatically generated">
+          <p:cNvPr id="33" name="Picture 32" descr="Chart, bar chart, histogram&#10;&#10;Description automatically generated">
             <a:extLst>
               <a:ext uri="{FF2B5EF4-FFF2-40B4-BE49-F238E27FC236}">
-                <a16:creationId xmlns:a16="http://schemas.microsoft.com/office/drawing/2014/main" id="{0271B184-928C-4703-A395-85A2C3758C0E}"/>
+                <a16:creationId xmlns:a16="http://schemas.microsoft.com/office/drawing/2014/main" id="{E0887932-9F33-4CD2-B65A-3FF20042F2B4}"/>
               </a:ext>
             </a:extLst>
           </p:cNvPr>
@@ -13718,8 +14154,8 @@
         </p:blipFill>
         <p:spPr>
           <a:xfrm>
-            <a:off x="6479838" y="819038"/>
-            <a:ext cx="5586942" cy="2410279"/>
+            <a:off x="749204" y="3703334"/>
+            <a:ext cx="5586942" cy="2670459"/>
           </a:xfrm>
           <a:prstGeom prst="rect">
             <a:avLst/>
@@ -13728,10 +14164,10 @@
       </p:pic>
       <p:pic>
         <p:nvPicPr>
-          <p:cNvPr id="33" name="Picture 32" descr="Chart, bar chart, histogram&#10;&#10;Description automatically generated">
+          <p:cNvPr id="3" name="Picture 2" descr="Chart&#10;&#10;Description automatically generated">
             <a:extLst>
               <a:ext uri="{FF2B5EF4-FFF2-40B4-BE49-F238E27FC236}">
-                <a16:creationId xmlns:a16="http://schemas.microsoft.com/office/drawing/2014/main" id="{E0887932-9F33-4CD2-B65A-3FF20042F2B4}"/>
+                <a16:creationId xmlns:a16="http://schemas.microsoft.com/office/drawing/2014/main" id="{5E2FE346-F668-4214-A804-A8FC1C339B7E}"/>
               </a:ext>
             </a:extLst>
           </p:cNvPr>
@@ -13754,8 +14190,8 @@
         </p:blipFill>
         <p:spPr>
           <a:xfrm>
-            <a:off x="749204" y="3963516"/>
-            <a:ext cx="5586942" cy="2410277"/>
+            <a:off x="6605058" y="706322"/>
+            <a:ext cx="5586942" cy="2512805"/>
           </a:xfrm>
           <a:prstGeom prst="rect">
             <a:avLst/>
@@ -13957,42 +14393,6 @@
           </a:fontRef>
         </p:style>
       </p:cxnSp>
-      <p:pic>
-        <p:nvPicPr>
-          <p:cNvPr id="11" name="Picture 10" descr="Chart, timeline, bar chart&#10;&#10;Description automatically generated">
-            <a:extLst>
-              <a:ext uri="{FF2B5EF4-FFF2-40B4-BE49-F238E27FC236}">
-                <a16:creationId xmlns:a16="http://schemas.microsoft.com/office/drawing/2014/main" id="{9AAE8F78-A579-4AFB-8F96-932A4C7BF4B0}"/>
-              </a:ext>
-            </a:extLst>
-          </p:cNvPr>
-          <p:cNvPicPr>
-            <a:picLocks noChangeAspect="1"/>
-          </p:cNvPicPr>
-          <p:nvPr/>
-        </p:nvPicPr>
-        <p:blipFill>
-          <a:blip r:embed="rId2">
-            <a:extLst>
-              <a:ext uri="{28A0092B-C50C-407E-A947-70E740481C1C}">
-                <a14:useLocalDpi xmlns:a14="http://schemas.microsoft.com/office/drawing/2010/main" val="0"/>
-              </a:ext>
-            </a:extLst>
-          </a:blip>
-          <a:stretch>
-            <a:fillRect/>
-          </a:stretch>
-        </p:blipFill>
-        <p:spPr>
-          <a:xfrm>
-            <a:off x="838616" y="2426818"/>
-            <a:ext cx="4441819" cy="3997637"/>
-          </a:xfrm>
-          <a:prstGeom prst="rect">
-            <a:avLst/>
-          </a:prstGeom>
-        </p:spPr>
-      </p:pic>
       <p:cxnSp>
         <p:nvCxnSpPr>
           <p:cNvPr id="20" name="Straight Connector 19">
@@ -14047,19 +14447,17 @@
       </p:cxnSp>
       <p:pic>
         <p:nvPicPr>
-          <p:cNvPr id="9" name="Content Placeholder 8" descr="Timeline&#10;&#10;Description automatically generated">
+          <p:cNvPr id="6" name="Picture 5" descr="Timeline&#10;&#10;Description automatically generated">
             <a:extLst>
               <a:ext uri="{FF2B5EF4-FFF2-40B4-BE49-F238E27FC236}">
-                <a16:creationId xmlns:a16="http://schemas.microsoft.com/office/drawing/2014/main" id="{88452512-E315-4FF5-8DE4-E6E2A4666037}"/>
+                <a16:creationId xmlns:a16="http://schemas.microsoft.com/office/drawing/2014/main" id="{D1A00307-1BBE-40F3-9CEB-AA60A0D998D8}"/>
               </a:ext>
             </a:extLst>
           </p:cNvPr>
           <p:cNvPicPr>
-            <a:picLocks noGrp="1" noChangeAspect="1"/>
+            <a:picLocks noChangeAspect="1"/>
           </p:cNvPicPr>
-          <p:nvPr>
-            <p:ph idx="1"/>
-          </p:nvPr>
+          <p:nvPr/>
         </p:nvPicPr>
         <p:blipFill>
           <a:blip r:embed="rId3">
@@ -14075,8 +14473,44 @@
         </p:blipFill>
         <p:spPr>
           <a:xfrm>
-            <a:off x="6952122" y="2426818"/>
-            <a:ext cx="4441819" cy="3997637"/>
+            <a:off x="6210871" y="2277800"/>
+            <a:ext cx="5715798" cy="4299823"/>
+          </a:xfrm>
+          <a:prstGeom prst="rect">
+            <a:avLst/>
+          </a:prstGeom>
+        </p:spPr>
+      </p:pic>
+      <p:pic>
+        <p:nvPicPr>
+          <p:cNvPr id="14" name="Picture 13" descr="Chart, bar chart&#10;&#10;Description automatically generated">
+            <a:extLst>
+              <a:ext uri="{FF2B5EF4-FFF2-40B4-BE49-F238E27FC236}">
+                <a16:creationId xmlns:a16="http://schemas.microsoft.com/office/drawing/2014/main" id="{9F51CC7C-8BBD-4C7F-A2D1-DAF6CCAD8AB6}"/>
+              </a:ext>
+            </a:extLst>
+          </p:cNvPr>
+          <p:cNvPicPr>
+            <a:picLocks noChangeAspect="1"/>
+          </p:cNvPicPr>
+          <p:nvPr/>
+        </p:nvPicPr>
+        <p:blipFill>
+          <a:blip r:embed="rId4">
+            <a:extLst>
+              <a:ext uri="{28A0092B-C50C-407E-A947-70E740481C1C}">
+                <a14:useLocalDpi xmlns:a14="http://schemas.microsoft.com/office/drawing/2010/main" val="0"/>
+              </a:ext>
+            </a:extLst>
+          </a:blip>
+          <a:stretch>
+            <a:fillRect/>
+          </a:stretch>
+        </p:blipFill>
+        <p:spPr>
+          <a:xfrm>
+            <a:off x="265331" y="2253377"/>
+            <a:ext cx="5715798" cy="4299823"/>
           </a:xfrm>
           <a:prstGeom prst="rect">
             <a:avLst/>
@@ -17255,14 +17689,14 @@
           <a:lstStyle/>
           <a:p>
             <a:r>
-              <a:rPr lang="en-US" sz="1800"/>
-              <a:t>By examining these graphs, there is some key difference between casual and member riders. </a:t>
+              <a:rPr lang="en-US" sz="1800" dirty="0"/>
+              <a:t>By examining these graphs, there are some key difference between casual and member riders. </a:t>
             </a:r>
           </a:p>
           <a:p>
             <a:r>
-              <a:rPr lang="en-US" sz="1800"/>
-              <a:t>By utilizing the story these graphs are telling, there is a higher chance of converting casual riders to an annual member.</a:t>
+              <a:rPr lang="en-US" sz="1800" dirty="0"/>
+              <a:t>By utilizing the stories these graphs are telling, there is a higher chance of converting casual riders to an annual member.</a:t>
             </a:r>
           </a:p>
         </p:txBody>
@@ -18429,7 +18863,7 @@
                   </a:schemeClr>
                 </a:solidFill>
               </a:rPr>
-              <a:t>We can create a targeted ad or sale for casual riders who spend less than 30 minutes per ride.</a:t>
+              <a:t>We can generate targeted ad for casual riders who spend less than 30 minutes per ride.</a:t>
             </a:r>
           </a:p>
           <a:p>
@@ -18442,7 +18876,7 @@
                   </a:schemeClr>
                 </a:solidFill>
               </a:rPr>
-              <a:t>Because most members spend &lt; 30 minutes per ride, we can safely assume that casual riders who spend &lt; 30 minutes per ride is a potential member.</a:t>
+              <a:t>Because most members spend &lt; 30 minutes per ride, we can safely assume that casual riders who spend &lt; 30 minutes per ride can be a potential member.</a:t>
             </a:r>
           </a:p>
           <a:p>
@@ -18454,7 +18888,7 @@
                   </a:schemeClr>
                 </a:solidFill>
               </a:rPr>
-              <a:t>By promoting extra benefits during the weekend to casual riders, there is a higher chance of converting them to members.</a:t>
+              <a:t>Due to a higher percentage of electric bike and docked bike usage in casual bikers, we can create a new membership that benefits electric and docked bike users.</a:t>
             </a:r>
           </a:p>
           <a:p>
@@ -18467,7 +18901,7 @@
                   </a:schemeClr>
                 </a:solidFill>
               </a:rPr>
-              <a:t>This is shown in the graph where majority of casual riders’ ride on the weekends. </a:t>
+              <a:t>This can potentially convert up to 50% casual bikers to members.</a:t>
             </a:r>
           </a:p>
           <a:p>
@@ -18479,7 +18913,7 @@
                   </a:schemeClr>
                 </a:solidFill>
               </a:rPr>
-              <a:t>Through the graph from bike type distribution, we can focus on the riders who ride docked bike as only casual riders use them. Converting those into members can marginally increase our profit.</a:t>
+              <a:t>Due to the majority of casual bikers' bike during the weekends, we can give special benefits for signing up over the weekend such as 10% off if signed up over weekend.</a:t>
             </a:r>
           </a:p>
         </p:txBody>
@@ -18790,4 +19224,299 @@
     </a:ext>
   </a:extLst>
 </a:theme>
+</file>
+
+<file path=ppt/theme/theme2.xml><?xml version="1.0" encoding="utf-8"?>
+<a:theme xmlns:a="http://schemas.openxmlformats.org/drawingml/2006/main" name="Office Theme">
+  <a:themeElements>
+    <a:clrScheme name="Office">
+      <a:dk1>
+        <a:sysClr val="windowText" lastClr="000000"/>
+      </a:dk1>
+      <a:lt1>
+        <a:sysClr val="window" lastClr="FFFFFF"/>
+      </a:lt1>
+      <a:dk2>
+        <a:srgbClr val="44546A"/>
+      </a:dk2>
+      <a:lt2>
+        <a:srgbClr val="E7E6E6"/>
+      </a:lt2>
+      <a:accent1>
+        <a:srgbClr val="4472C4"/>
+      </a:accent1>
+      <a:accent2>
+        <a:srgbClr val="ED7D31"/>
+      </a:accent2>
+      <a:accent3>
+        <a:srgbClr val="A5A5A5"/>
+      </a:accent3>
+      <a:accent4>
+        <a:srgbClr val="FFC000"/>
+      </a:accent4>
+      <a:accent5>
+        <a:srgbClr val="5B9BD5"/>
+      </a:accent5>
+      <a:accent6>
+        <a:srgbClr val="70AD47"/>
+      </a:accent6>
+      <a:hlink>
+        <a:srgbClr val="0563C1"/>
+      </a:hlink>
+      <a:folHlink>
+        <a:srgbClr val="954F72"/>
+      </a:folHlink>
+    </a:clrScheme>
+    <a:fontScheme name="Office">
+      <a:majorFont>
+        <a:latin typeface="Calibri Light" panose="020F0302020204030204"/>
+        <a:ea typeface=""/>
+        <a:cs typeface=""/>
+        <a:font script="Jpan" typeface="游ゴシック Light"/>
+        <a:font script="Hang" typeface="맑은 고딕"/>
+        <a:font script="Hans" typeface="等线 Light"/>
+        <a:font script="Hant" typeface="新細明體"/>
+        <a:font script="Arab" typeface="Times New Roman"/>
+        <a:font script="Hebr" typeface="Times New Roman"/>
+        <a:font script="Thai" typeface="Angsana New"/>
+        <a:font script="Ethi" typeface="Nyala"/>
+        <a:font script="Beng" typeface="Vrinda"/>
+        <a:font script="Gujr" typeface="Shruti"/>
+        <a:font script="Khmr" typeface="MoolBoran"/>
+        <a:font script="Knda" typeface="Tunga"/>
+        <a:font script="Guru" typeface="Raavi"/>
+        <a:font script="Cans" typeface="Euphemia"/>
+        <a:font script="Cher" typeface="Plantagenet Cherokee"/>
+        <a:font script="Yiii" typeface="Microsoft Yi Baiti"/>
+        <a:font script="Tibt" typeface="Microsoft Himalaya"/>
+        <a:font script="Thaa" typeface="MV Boli"/>
+        <a:font script="Deva" typeface="Mangal"/>
+        <a:font script="Telu" typeface="Gautami"/>
+        <a:font script="Taml" typeface="Latha"/>
+        <a:font script="Syrc" typeface="Estrangelo Edessa"/>
+        <a:font script="Orya" typeface="Kalinga"/>
+        <a:font script="Mlym" typeface="Kartika"/>
+        <a:font script="Laoo" typeface="DokChampa"/>
+        <a:font script="Sinh" typeface="Iskoola Pota"/>
+        <a:font script="Mong" typeface="Mongolian Baiti"/>
+        <a:font script="Viet" typeface="Times New Roman"/>
+        <a:font script="Uigh" typeface="Microsoft Uighur"/>
+        <a:font script="Geor" typeface="Sylfaen"/>
+        <a:font script="Armn" typeface="Arial"/>
+        <a:font script="Bugi" typeface="Leelawadee UI"/>
+        <a:font script="Bopo" typeface="Microsoft JhengHei"/>
+        <a:font script="Java" typeface="Javanese Text"/>
+        <a:font script="Lisu" typeface="Segoe UI"/>
+        <a:font script="Mymr" typeface="Myanmar Text"/>
+        <a:font script="Nkoo" typeface="Ebrima"/>
+        <a:font script="Olck" typeface="Nirmala UI"/>
+        <a:font script="Osma" typeface="Ebrima"/>
+        <a:font script="Phag" typeface="Phagspa"/>
+        <a:font script="Syrn" typeface="Estrangelo Edessa"/>
+        <a:font script="Syrj" typeface="Estrangelo Edessa"/>
+        <a:font script="Syre" typeface="Estrangelo Edessa"/>
+        <a:font script="Sora" typeface="Nirmala UI"/>
+        <a:font script="Tale" typeface="Microsoft Tai Le"/>
+        <a:font script="Talu" typeface="Microsoft New Tai Lue"/>
+        <a:font script="Tfng" typeface="Ebrima"/>
+      </a:majorFont>
+      <a:minorFont>
+        <a:latin typeface="Calibri" panose="020F0502020204030204"/>
+        <a:ea typeface=""/>
+        <a:cs typeface=""/>
+        <a:font script="Jpan" typeface="游ゴシック"/>
+        <a:font script="Hang" typeface="맑은 고딕"/>
+        <a:font script="Hans" typeface="等线"/>
+        <a:font script="Hant" typeface="新細明體"/>
+        <a:font script="Arab" typeface="Arial"/>
+        <a:font script="Hebr" typeface="Arial"/>
+        <a:font script="Thai" typeface="Cordia New"/>
+        <a:font script="Ethi" typeface="Nyala"/>
+        <a:font script="Beng" typeface="Vrinda"/>
+        <a:font script="Gujr" typeface="Shruti"/>
+        <a:font script="Khmr" typeface="DaunPenh"/>
+        <a:font script="Knda" typeface="Tunga"/>
+        <a:font script="Guru" typeface="Raavi"/>
+        <a:font script="Cans" typeface="Euphemia"/>
+        <a:font script="Cher" typeface="Plantagenet Cherokee"/>
+        <a:font script="Yiii" typeface="Microsoft Yi Baiti"/>
+        <a:font script="Tibt" typeface="Microsoft Himalaya"/>
+        <a:font script="Thaa" typeface="MV Boli"/>
+        <a:font script="Deva" typeface="Mangal"/>
+        <a:font script="Telu" typeface="Gautami"/>
+        <a:font script="Taml" typeface="Latha"/>
+        <a:font script="Syrc" typeface="Estrangelo Edessa"/>
+        <a:font script="Orya" typeface="Kalinga"/>
+        <a:font script="Mlym" typeface="Kartika"/>
+        <a:font script="Laoo" typeface="DokChampa"/>
+        <a:font script="Sinh" typeface="Iskoola Pota"/>
+        <a:font script="Mong" typeface="Mongolian Baiti"/>
+        <a:font script="Viet" typeface="Arial"/>
+        <a:font script="Uigh" typeface="Microsoft Uighur"/>
+        <a:font script="Geor" typeface="Sylfaen"/>
+        <a:font script="Armn" typeface="Arial"/>
+        <a:font script="Bugi" typeface="Leelawadee UI"/>
+        <a:font script="Bopo" typeface="Microsoft JhengHei"/>
+        <a:font script="Java" typeface="Javanese Text"/>
+        <a:font script="Lisu" typeface="Segoe UI"/>
+        <a:font script="Mymr" typeface="Myanmar Text"/>
+        <a:font script="Nkoo" typeface="Ebrima"/>
+        <a:font script="Olck" typeface="Nirmala UI"/>
+        <a:font script="Osma" typeface="Ebrima"/>
+        <a:font script="Phag" typeface="Phagspa"/>
+        <a:font script="Syrn" typeface="Estrangelo Edessa"/>
+        <a:font script="Syrj" typeface="Estrangelo Edessa"/>
+        <a:font script="Syre" typeface="Estrangelo Edessa"/>
+        <a:font script="Sora" typeface="Nirmala UI"/>
+        <a:font script="Tale" typeface="Microsoft Tai Le"/>
+        <a:font script="Talu" typeface="Microsoft New Tai Lue"/>
+        <a:font script="Tfng" typeface="Ebrima"/>
+      </a:minorFont>
+    </a:fontScheme>
+    <a:fmtScheme name="Office">
+      <a:fillStyleLst>
+        <a:solidFill>
+          <a:schemeClr val="phClr"/>
+        </a:solidFill>
+        <a:gradFill rotWithShape="1">
+          <a:gsLst>
+            <a:gs pos="0">
+              <a:schemeClr val="phClr">
+                <a:lumMod val="110000"/>
+                <a:satMod val="105000"/>
+                <a:tint val="67000"/>
+              </a:schemeClr>
+            </a:gs>
+            <a:gs pos="50000">
+              <a:schemeClr val="phClr">
+                <a:lumMod val="105000"/>
+                <a:satMod val="103000"/>
+                <a:tint val="73000"/>
+              </a:schemeClr>
+            </a:gs>
+            <a:gs pos="100000">
+              <a:schemeClr val="phClr">
+                <a:lumMod val="105000"/>
+                <a:satMod val="109000"/>
+                <a:tint val="81000"/>
+              </a:schemeClr>
+            </a:gs>
+          </a:gsLst>
+          <a:lin ang="5400000" scaled="0"/>
+        </a:gradFill>
+        <a:gradFill rotWithShape="1">
+          <a:gsLst>
+            <a:gs pos="0">
+              <a:schemeClr val="phClr">
+                <a:satMod val="103000"/>
+                <a:lumMod val="102000"/>
+                <a:tint val="94000"/>
+              </a:schemeClr>
+            </a:gs>
+            <a:gs pos="50000">
+              <a:schemeClr val="phClr">
+                <a:satMod val="110000"/>
+                <a:lumMod val="100000"/>
+                <a:shade val="100000"/>
+              </a:schemeClr>
+            </a:gs>
+            <a:gs pos="100000">
+              <a:schemeClr val="phClr">
+                <a:lumMod val="99000"/>
+                <a:satMod val="120000"/>
+                <a:shade val="78000"/>
+              </a:schemeClr>
+            </a:gs>
+          </a:gsLst>
+          <a:lin ang="5400000" scaled="0"/>
+        </a:gradFill>
+      </a:fillStyleLst>
+      <a:lnStyleLst>
+        <a:ln w="6350" cap="flat" cmpd="sng" algn="ctr">
+          <a:solidFill>
+            <a:schemeClr val="phClr"/>
+          </a:solidFill>
+          <a:prstDash val="solid"/>
+          <a:miter lim="800000"/>
+        </a:ln>
+        <a:ln w="12700" cap="flat" cmpd="sng" algn="ctr">
+          <a:solidFill>
+            <a:schemeClr val="phClr"/>
+          </a:solidFill>
+          <a:prstDash val="solid"/>
+          <a:miter lim="800000"/>
+        </a:ln>
+        <a:ln w="19050" cap="flat" cmpd="sng" algn="ctr">
+          <a:solidFill>
+            <a:schemeClr val="phClr"/>
+          </a:solidFill>
+          <a:prstDash val="solid"/>
+          <a:miter lim="800000"/>
+        </a:ln>
+      </a:lnStyleLst>
+      <a:effectStyleLst>
+        <a:effectStyle>
+          <a:effectLst/>
+        </a:effectStyle>
+        <a:effectStyle>
+          <a:effectLst/>
+        </a:effectStyle>
+        <a:effectStyle>
+          <a:effectLst>
+            <a:outerShdw blurRad="57150" dist="19050" dir="5400000" algn="ctr" rotWithShape="0">
+              <a:srgbClr val="000000">
+                <a:alpha val="63000"/>
+              </a:srgbClr>
+            </a:outerShdw>
+          </a:effectLst>
+        </a:effectStyle>
+      </a:effectStyleLst>
+      <a:bgFillStyleLst>
+        <a:solidFill>
+          <a:schemeClr val="phClr"/>
+        </a:solidFill>
+        <a:solidFill>
+          <a:schemeClr val="phClr">
+            <a:tint val="95000"/>
+            <a:satMod val="170000"/>
+          </a:schemeClr>
+        </a:solidFill>
+        <a:gradFill rotWithShape="1">
+          <a:gsLst>
+            <a:gs pos="0">
+              <a:schemeClr val="phClr">
+                <a:tint val="93000"/>
+                <a:satMod val="150000"/>
+                <a:shade val="98000"/>
+                <a:lumMod val="102000"/>
+              </a:schemeClr>
+            </a:gs>
+            <a:gs pos="50000">
+              <a:schemeClr val="phClr">
+                <a:tint val="98000"/>
+                <a:satMod val="130000"/>
+                <a:shade val="90000"/>
+                <a:lumMod val="103000"/>
+              </a:schemeClr>
+            </a:gs>
+            <a:gs pos="100000">
+              <a:schemeClr val="phClr">
+                <a:shade val="63000"/>
+                <a:satMod val="120000"/>
+              </a:schemeClr>
+            </a:gs>
+          </a:gsLst>
+          <a:lin ang="5400000" scaled="0"/>
+        </a:gradFill>
+      </a:bgFillStyleLst>
+    </a:fmtScheme>
+  </a:themeElements>
+  <a:objectDefaults/>
+  <a:extraClrSchemeLst/>
+  <a:extLst>
+    <a:ext uri="{05A4C25C-085E-4340-85A3-A5531E510DB2}">
+      <thm15:themeFamily xmlns:thm15="http://schemas.microsoft.com/office/thememl/2012/main" name="Office Theme" id="{62F939B6-93AF-4DB8-9C6B-D6C7DFDC589F}" vid="{4A3C46E8-61CC-4603-A589-7422A47A8E4A}"/>
+    </a:ext>
+  </a:extLst>
+</a:theme>
 </file>
</xml_diff>

<commit_message>
Updated PPT and RMarkdown
</commit_message>
<xml_diff>
--- a/Case Study for Cyclistic.pptx
+++ b/Case Study for Cyclistic.pptx
@@ -124,6 +124,14 @@
 </p:presentation>
 </file>
 
+<file path=ppt/revisionInfo.xml><?xml version="1.0" encoding="utf-8"?>
+<p1510:revInfo xmlns:a="http://schemas.openxmlformats.org/drawingml/2006/main" xmlns:r="http://schemas.openxmlformats.org/officeDocument/2006/relationships" xmlns:p1510="http://schemas.microsoft.com/office/powerpoint/2015/10/main">
+  <p1510:revLst>
+    <p1510:client id="{85C1CF53-34EA-4D89-841F-8F184473BD51}" v="359" dt="2021-08-30T16:29:26.878"/>
+  </p1510:revLst>
+</p1510:revInfo>
+</file>
+
 <file path=ppt/notesMasters/notesMaster1.xml><?xml version="1.0" encoding="utf-8"?>
 <p:notesMaster xmlns:a="http://schemas.openxmlformats.org/drawingml/2006/main" xmlns:r="http://schemas.openxmlformats.org/officeDocument/2006/relationships" xmlns:p="http://schemas.openxmlformats.org/presentationml/2006/main">
   <p:cSld>
@@ -206,7 +214,7 @@
           <a:p>
             <a:fld id="{720C8D81-C60F-490F-A095-00E127F6CCB9}" type="datetimeFigureOut">
               <a:rPr lang="en-US" smtClean="0"/>
-              <a:t>8/23/2021</a:t>
+              <a:t>8/30/2021</a:t>
             </a:fld>
             <a:endParaRPr lang="en-US"/>
           </a:p>
@@ -704,7 +712,7 @@
           <a:p>
             <a:fld id="{A2DCA549-137D-472C-BCD6-A12B852F0C95}" type="datetimeFigureOut">
               <a:rPr lang="en-US" smtClean="0"/>
-              <a:t>8/23/2021</a:t>
+              <a:t>8/30/2021</a:t>
             </a:fld>
             <a:endParaRPr lang="en-US"/>
           </a:p>
@@ -902,7 +910,7 @@
           <a:p>
             <a:fld id="{A2DCA549-137D-472C-BCD6-A12B852F0C95}" type="datetimeFigureOut">
               <a:rPr lang="en-US" smtClean="0"/>
-              <a:t>8/23/2021</a:t>
+              <a:t>8/30/2021</a:t>
             </a:fld>
             <a:endParaRPr lang="en-US"/>
           </a:p>
@@ -1110,7 +1118,7 @@
           <a:p>
             <a:fld id="{A2DCA549-137D-472C-BCD6-A12B852F0C95}" type="datetimeFigureOut">
               <a:rPr lang="en-US" smtClean="0"/>
-              <a:t>8/23/2021</a:t>
+              <a:t>8/30/2021</a:t>
             </a:fld>
             <a:endParaRPr lang="en-US"/>
           </a:p>
@@ -1308,7 +1316,7 @@
           <a:p>
             <a:fld id="{A2DCA549-137D-472C-BCD6-A12B852F0C95}" type="datetimeFigureOut">
               <a:rPr lang="en-US" smtClean="0"/>
-              <a:t>8/23/2021</a:t>
+              <a:t>8/30/2021</a:t>
             </a:fld>
             <a:endParaRPr lang="en-US"/>
           </a:p>
@@ -1583,7 +1591,7 @@
           <a:p>
             <a:fld id="{A2DCA549-137D-472C-BCD6-A12B852F0C95}" type="datetimeFigureOut">
               <a:rPr lang="en-US" smtClean="0"/>
-              <a:t>8/23/2021</a:t>
+              <a:t>8/30/2021</a:t>
             </a:fld>
             <a:endParaRPr lang="en-US"/>
           </a:p>
@@ -1848,7 +1856,7 @@
           <a:p>
             <a:fld id="{A2DCA549-137D-472C-BCD6-A12B852F0C95}" type="datetimeFigureOut">
               <a:rPr lang="en-US" smtClean="0"/>
-              <a:t>8/23/2021</a:t>
+              <a:t>8/30/2021</a:t>
             </a:fld>
             <a:endParaRPr lang="en-US"/>
           </a:p>
@@ -2260,7 +2268,7 @@
           <a:p>
             <a:fld id="{A2DCA549-137D-472C-BCD6-A12B852F0C95}" type="datetimeFigureOut">
               <a:rPr lang="en-US" smtClean="0"/>
-              <a:t>8/23/2021</a:t>
+              <a:t>8/30/2021</a:t>
             </a:fld>
             <a:endParaRPr lang="en-US"/>
           </a:p>
@@ -2401,7 +2409,7 @@
           <a:p>
             <a:fld id="{A2DCA549-137D-472C-BCD6-A12B852F0C95}" type="datetimeFigureOut">
               <a:rPr lang="en-US" smtClean="0"/>
-              <a:t>8/23/2021</a:t>
+              <a:t>8/30/2021</a:t>
             </a:fld>
             <a:endParaRPr lang="en-US"/>
           </a:p>
@@ -2514,7 +2522,7 @@
           <a:p>
             <a:fld id="{A2DCA549-137D-472C-BCD6-A12B852F0C95}" type="datetimeFigureOut">
               <a:rPr lang="en-US" smtClean="0"/>
-              <a:t>8/23/2021</a:t>
+              <a:t>8/30/2021</a:t>
             </a:fld>
             <a:endParaRPr lang="en-US"/>
           </a:p>
@@ -2825,7 +2833,7 @@
           <a:p>
             <a:fld id="{A2DCA549-137D-472C-BCD6-A12B852F0C95}" type="datetimeFigureOut">
               <a:rPr lang="en-US" smtClean="0"/>
-              <a:t>8/23/2021</a:t>
+              <a:t>8/30/2021</a:t>
             </a:fld>
             <a:endParaRPr lang="en-US"/>
           </a:p>
@@ -3113,7 +3121,7 @@
           <a:p>
             <a:fld id="{A2DCA549-137D-472C-BCD6-A12B852F0C95}" type="datetimeFigureOut">
               <a:rPr lang="en-US" smtClean="0"/>
-              <a:t>8/23/2021</a:t>
+              <a:t>8/30/2021</a:t>
             </a:fld>
             <a:endParaRPr lang="en-US"/>
           </a:p>
@@ -3354,7 +3362,7 @@
           <a:p>
             <a:fld id="{A2DCA549-137D-472C-BCD6-A12B852F0C95}" type="datetimeFigureOut">
               <a:rPr lang="en-US" smtClean="0"/>
-              <a:t>8/23/2021</a:t>
+              <a:t>8/30/2021</a:t>
             </a:fld>
             <a:endParaRPr lang="en-US"/>
           </a:p>
@@ -8351,7 +8359,7 @@
           <a:lstStyle/>
           <a:p>
             <a:r>
-              <a:rPr lang="en-US" sz="3600" kern="1200">
+              <a:rPr lang="en-US" sz="3600" kern="1200" dirty="0">
                 <a:solidFill>
                   <a:schemeClr val="bg1"/>
                 </a:solidFill>
@@ -8451,7 +8459,7 @@
         </p:nvSpPr>
         <p:spPr>
           <a:xfrm>
-            <a:off x="8902734" y="5776333"/>
+            <a:off x="8902734" y="1406739"/>
             <a:ext cx="2926080" cy="670311"/>
           </a:xfrm>
           <a:prstGeom prst="rect">
@@ -12600,12 +12608,12 @@
           <a:chExt cx="0" cy="0"/>
         </a:xfrm>
       </p:grpSpPr>
-      <p:sp useBgFill="1">
+      <p:sp>
         <p:nvSpPr>
-          <p:cNvPr id="48" name="Rectangle 47">
+          <p:cNvPr id="97" name="Rectangle 98">
             <a:extLst>
               <a:ext uri="{FF2B5EF4-FFF2-40B4-BE49-F238E27FC236}">
-                <a16:creationId xmlns:a16="http://schemas.microsoft.com/office/drawing/2014/main" id="{7316481C-0A49-4796-812B-0D64F063B720}"/>
+                <a16:creationId xmlns:a16="http://schemas.microsoft.com/office/drawing/2014/main" id="{5E52985E-2553-471E-82AA-5ED7A329890A}"/>
               </a:ext>
               <a:ext uri="{C183D7F6-B498-43B3-948B-1728B52AA6E4}">
                 <adec:decorative xmlns:adec="http://schemas.microsoft.com/office/drawing/2017/decorative" val="1"/>
@@ -12623,16 +12631,27 @@
             </p:extLst>
           </p:nvPr>
         </p:nvSpPr>
-        <p:spPr>
+        <p:spPr bwMode="ltGray">
           <a:xfrm>
-            <a:off x="0" y="0"/>
-            <a:ext cx="12192000" cy="6858000"/>
+            <a:off x="393308" y="352931"/>
+            <a:ext cx="11438793" cy="1844256"/>
           </a:xfrm>
           <a:prstGeom prst="rect">
             <a:avLst/>
           </a:prstGeom>
-          <a:ln>
-            <a:noFill/>
+          <a:solidFill>
+            <a:schemeClr val="tx1">
+              <a:lumMod val="75000"/>
+              <a:lumOff val="25000"/>
+            </a:schemeClr>
+          </a:solidFill>
+          <a:ln w="127000" cap="sq" cmpd="thinThick">
+            <a:solidFill>
+              <a:schemeClr val="tx1">
+                <a:lumMod val="75000"/>
+                <a:lumOff val="25000"/>
+              </a:schemeClr>
+            </a:solidFill>
           </a:ln>
         </p:spPr>
         <p:style>
@@ -12655,8 +12674,37 @@
           <a:bodyPr rtlCol="0" anchor="ctr"/>
           <a:lstStyle/>
           <a:p>
-            <a:pPr algn="ctr"/>
-            <a:endParaRPr lang="en-US"/>
+            <a:pPr marL="0" marR="0" lvl="0" indent="0" algn="ctr" defTabSz="914400" rtl="0" eaLnBrk="1" fontAlgn="auto" latinLnBrk="0" hangingPunct="1">
+              <a:lnSpc>
+                <a:spcPct val="100000"/>
+              </a:lnSpc>
+              <a:spcBef>
+                <a:spcPts val="0"/>
+              </a:spcBef>
+              <a:spcAft>
+                <a:spcPts val="0"/>
+              </a:spcAft>
+              <a:buClrTx/>
+              <a:buSzTx/>
+              <a:buFontTx/>
+              <a:buNone/>
+              <a:tabLst/>
+              <a:defRPr/>
+            </a:pPr>
+            <a:endParaRPr kumimoji="0" lang="en-US" sz="1800" b="0" i="0" u="none" strike="noStrike" kern="1200" cap="none" spc="0" normalizeH="0" baseline="0" noProof="0">
+              <a:ln>
+                <a:noFill/>
+              </a:ln>
+              <a:solidFill>
+                <a:prstClr val="white"/>
+              </a:solidFill>
+              <a:effectLst/>
+              <a:uLnTx/>
+              <a:uFillTx/>
+              <a:latin typeface="Calibri" panose="020F0502020204030204"/>
+              <a:ea typeface="+mn-ea"/>
+              <a:cs typeface="+mn-cs"/>
+            </a:endParaRPr>
           </a:p>
         </p:txBody>
       </p:sp>
@@ -12674,20 +12722,20 @@
         </p:nvSpPr>
         <p:spPr>
           <a:xfrm>
-            <a:off x="815593" y="-360242"/>
-            <a:ext cx="3808960" cy="2325676"/>
+            <a:off x="649270" y="506727"/>
+            <a:ext cx="3885141" cy="1526741"/>
           </a:xfrm>
           <a:prstGeom prst="rect">
             <a:avLst/>
           </a:prstGeom>
         </p:spPr>
         <p:txBody>
-          <a:bodyPr vert="horz" lIns="91440" tIns="45720" rIns="91440" bIns="45720" rtlCol="0" anchor="b">
+          <a:bodyPr vert="horz" lIns="91440" tIns="45720" rIns="91440" bIns="45720" rtlCol="0" anchor="ctr">
             <a:normAutofit/>
           </a:bodyPr>
           <a:lstStyle/>
           <a:p>
-            <a:pPr>
+            <a:pPr algn="r">
               <a:lnSpc>
                 <a:spcPct val="90000"/>
               </a:lnSpc>
@@ -12699,7 +12747,10 @@
               </a:spcAft>
             </a:pPr>
             <a:r>
-              <a:rPr lang="en-US" sz="4200" dirty="0">
+              <a:rPr lang="en-US" sz="3000">
+                <a:solidFill>
+                  <a:schemeClr val="bg1"/>
+                </a:solidFill>
                 <a:latin typeface="+mj-lt"/>
                 <a:ea typeface="+mj-ea"/>
                 <a:cs typeface="+mj-cs"/>
@@ -12709,21 +12760,21 @@
           </a:p>
         </p:txBody>
       </p:sp>
-      <p:sp>
-        <p:nvSpPr>
-          <p:cNvPr id="50" name="Rectangle 49">
+      <p:cxnSp>
+        <p:nvCxnSpPr>
+          <p:cNvPr id="98" name="Straight Connector 100">
             <a:extLst>
               <a:ext uri="{FF2B5EF4-FFF2-40B4-BE49-F238E27FC236}">
-                <a16:creationId xmlns:a16="http://schemas.microsoft.com/office/drawing/2014/main" id="{A5271697-90F1-4A23-8EF2-0179F2EAFACB}"/>
+                <a16:creationId xmlns:a16="http://schemas.microsoft.com/office/drawing/2014/main" id="{DAE3ABC6-4042-4293-A7DF-F01181363B7E}"/>
               </a:ext>
               <a:ext uri="{C183D7F6-B498-43B3-948B-1728B52AA6E4}">
                 <adec:decorative xmlns:adec="http://schemas.microsoft.com/office/drawing/2017/decorative" val="1"/>
               </a:ext>
             </a:extLst>
           </p:cNvPr>
-          <p:cNvSpPr>
-            <a:spLocks noGrp="1" noRot="1" noChangeAspect="1" noMove="1" noResize="1" noEditPoints="1" noAdjustHandles="1" noChangeArrowheads="1" noChangeShapeType="1" noTextEdit="1"/>
-          </p:cNvSpPr>
+          <p:cNvCxnSpPr>
+            <a:cxnSpLocks noGrp="1" noRot="1" noChangeAspect="1" noMove="1" noResize="1" noEditPoints="1" noAdjustHandles="1" noChangeArrowheads="1" noChangeShapeType="1"/>
+          </p:cNvCxnSpPr>
           <p:nvPr>
             <p:extLst>
               <p:ext uri="{386F3935-93C4-4BCD-93E2-E3B085C9AB24}">
@@ -12731,1308 +12782,115 @@
               </p:ext>
             </p:extLst>
           </p:nvPr>
-        </p:nvSpPr>
+        </p:nvCxnSpPr>
         <p:spPr>
-          <a:xfrm>
-            <a:off x="-1" y="1"/>
-            <a:ext cx="606972" cy="3233984"/>
+          <a:xfrm flipV="1">
+            <a:off x="4739873" y="580963"/>
+            <a:ext cx="0" cy="1371600"/>
           </a:xfrm>
-          <a:prstGeom prst="rect">
+          <a:prstGeom prst="line">
             <a:avLst/>
           </a:prstGeom>
-          <a:solidFill>
-            <a:schemeClr val="tx1">
-              <a:lumMod val="85000"/>
-              <a:lumOff val="15000"/>
-            </a:schemeClr>
-          </a:solidFill>
-          <a:ln>
-            <a:noFill/>
+          <a:ln w="19050">
+            <a:solidFill>
+              <a:schemeClr val="bg1">
+                <a:alpha val="75000"/>
+              </a:schemeClr>
+            </a:solidFill>
           </a:ln>
         </p:spPr>
         <p:style>
-          <a:lnRef idx="2">
-            <a:schemeClr val="accent1">
-              <a:shade val="50000"/>
-            </a:schemeClr>
+          <a:lnRef idx="1">
+            <a:schemeClr val="accent1"/>
           </a:lnRef>
-          <a:fillRef idx="1">
+          <a:fillRef idx="0">
             <a:schemeClr val="accent1"/>
           </a:fillRef>
           <a:effectRef idx="0">
             <a:schemeClr val="accent1"/>
           </a:effectRef>
           <a:fontRef idx="minor">
-            <a:schemeClr val="lt1"/>
+            <a:schemeClr val="tx1"/>
           </a:fontRef>
         </p:style>
+      </p:cxnSp>
+      <p:sp>
+        <p:nvSpPr>
+          <p:cNvPr id="5" name="TextBox 4">
+            <a:extLst>
+              <a:ext uri="{FF2B5EF4-FFF2-40B4-BE49-F238E27FC236}">
+                <a16:creationId xmlns:a16="http://schemas.microsoft.com/office/drawing/2014/main" id="{C5806C6A-5E95-449A-819B-D67B84BFE564}"/>
+              </a:ext>
+            </a:extLst>
+          </p:cNvPr>
+          <p:cNvSpPr txBox="1"/>
+          <p:nvPr/>
+        </p:nvSpPr>
+        <p:spPr>
+          <a:xfrm>
+            <a:off x="4945336" y="506727"/>
+            <a:ext cx="6609921" cy="1526741"/>
+          </a:xfrm>
+          <a:prstGeom prst="rect">
+            <a:avLst/>
+          </a:prstGeom>
+        </p:spPr>
         <p:txBody>
-          <a:bodyPr rtlCol="0" anchor="ctr"/>
+          <a:bodyPr rot="0" spcFirstLastPara="0" vertOverflow="overflow" horzOverflow="overflow" vert="horz" lIns="91440" tIns="45720" rIns="91440" bIns="45720" numCol="1" spcCol="0" rtlCol="0" fromWordArt="0" anchor="ctr" anchorCtr="0" forceAA="0" compatLnSpc="1">
+            <a:prstTxWarp prst="textNoShape">
+              <a:avLst/>
+            </a:prstTxWarp>
+            <a:normAutofit/>
+          </a:bodyPr>
           <a:lstStyle/>
           <a:p>
-            <a:pPr algn="ctr"/>
-            <a:endParaRPr lang="en-US"/>
+            <a:pPr indent="-228600">
+              <a:lnSpc>
+                <a:spcPct val="90000"/>
+              </a:lnSpc>
+              <a:spcAft>
+                <a:spcPts val="600"/>
+              </a:spcAft>
+              <a:buFont typeface="Arial" panose="020B0604020202020204" pitchFamily="34" charset="0"/>
+              <a:buChar char="•"/>
+            </a:pPr>
+            <a:r>
+              <a:rPr lang="en-US" sz="1900">
+                <a:solidFill>
+                  <a:schemeClr val="bg1"/>
+                </a:solidFill>
+              </a:rPr>
+              <a:t>There is a significant increase in percentage of casual bikers on the weekends.</a:t>
+            </a:r>
+          </a:p>
+          <a:p>
+            <a:pPr indent="-228600">
+              <a:lnSpc>
+                <a:spcPct val="90000"/>
+              </a:lnSpc>
+              <a:spcAft>
+                <a:spcPts val="600"/>
+              </a:spcAft>
+              <a:buFont typeface="Arial" panose="020B0604020202020204" pitchFamily="34" charset="0"/>
+              <a:buChar char="•"/>
+            </a:pPr>
+            <a:r>
+              <a:rPr lang="en-US" sz="1900">
+                <a:solidFill>
+                  <a:schemeClr val="bg1"/>
+                </a:solidFill>
+              </a:rPr>
+              <a:t>Member bikers use bikes as their main source of transportation due to a relatively same percentage throughout the week.</a:t>
+            </a:r>
           </a:p>
         </p:txBody>
       </p:sp>
-      <p:grpSp>
-        <p:nvGrpSpPr>
-          <p:cNvPr id="52" name="Group 51">
+      <p:pic>
+        <p:nvPicPr>
+          <p:cNvPr id="4" name="Picture 4" descr="Chart, line chart&#10;&#10;Description automatically generated">
             <a:extLst>
               <a:ext uri="{FF2B5EF4-FFF2-40B4-BE49-F238E27FC236}">
-                <a16:creationId xmlns:a16="http://schemas.microsoft.com/office/drawing/2014/main" id="{1F49CE81-B2F4-47B2-9D4A-886DCE0A8404}"/>
-              </a:ext>
-              <a:ext uri="{C183D7F6-B498-43B3-948B-1728B52AA6E4}">
-                <adec:decorative xmlns:adec="http://schemas.microsoft.com/office/drawing/2017/decorative" val="1"/>
-              </a:ext>
-            </a:extLst>
-          </p:cNvPr>
-          <p:cNvGrpSpPr>
-            <a:grpSpLocks noGrp="1" noUngrp="1" noRot="1" noChangeAspect="1" noMove="1" noResize="1"/>
-          </p:cNvGrpSpPr>
-          <p:nvPr>
-            <p:extLst>
-              <p:ext uri="{386F3935-93C4-4BCD-93E2-E3B085C9AB24}">
-                <p16:designElem xmlns:p16="http://schemas.microsoft.com/office/powerpoint/2015/main" val="1"/>
-              </p:ext>
-            </p:extLst>
-          </p:nvPr>
-        </p:nvGrpSpPr>
-        <p:grpSpPr>
-          <a:xfrm>
-            <a:off x="1188720" y="73152"/>
-            <a:ext cx="1178966" cy="232963"/>
-            <a:chOff x="7763256" y="73152"/>
-            <a:chExt cx="1178966" cy="232963"/>
-          </a:xfrm>
-        </p:grpSpPr>
-        <p:sp>
-          <p:nvSpPr>
-            <p:cNvPr id="53" name="Rectangle 64">
-              <a:extLst>
-                <a:ext uri="{FF2B5EF4-FFF2-40B4-BE49-F238E27FC236}">
-                  <a16:creationId xmlns:a16="http://schemas.microsoft.com/office/drawing/2014/main" id="{4BE32177-3EAD-42DA-997C-8DAE1BFEE58F}"/>
-                </a:ext>
-                <a:ext uri="{C183D7F6-B498-43B3-948B-1728B52AA6E4}">
-                  <adec:decorative xmlns:adec="http://schemas.microsoft.com/office/drawing/2017/decorative" val="1"/>
-                </a:ext>
-              </a:extLst>
-            </p:cNvPr>
-            <p:cNvSpPr/>
-            <p:nvPr>
-              <p:extLst>
-                <p:ext uri="{386F3935-93C4-4BCD-93E2-E3B085C9AB24}">
-                  <p16:designElem xmlns:p16="http://schemas.microsoft.com/office/powerpoint/2015/main" val="1"/>
-                </p:ext>
-              </p:extLst>
-            </p:nvPr>
-          </p:nvSpPr>
-          <p:spPr>
-            <a:xfrm>
-              <a:off x="8263077" y="73152"/>
-              <a:ext cx="54368" cy="59227"/>
-            </a:xfrm>
-            <a:prstGeom prst="ellipse">
-              <a:avLst/>
-            </a:prstGeom>
-            <a:solidFill>
-              <a:schemeClr val="accent1"/>
-            </a:solidFill>
-            <a:ln>
-              <a:noFill/>
-            </a:ln>
-          </p:spPr>
-          <p:style>
-            <a:lnRef idx="2">
-              <a:schemeClr val="accent1">
-                <a:shade val="50000"/>
-              </a:schemeClr>
-            </a:lnRef>
-            <a:fillRef idx="1">
-              <a:schemeClr val="accent1"/>
-            </a:fillRef>
-            <a:effectRef idx="0">
-              <a:schemeClr val="accent1"/>
-            </a:effectRef>
-            <a:fontRef idx="minor">
-              <a:schemeClr val="lt1"/>
-            </a:fontRef>
-          </p:style>
-          <p:txBody>
-            <a:bodyPr rtlCol="0" anchor="ctr"/>
-            <a:lstStyle/>
-            <a:p>
-              <a:pPr algn="ctr"/>
-              <a:endParaRPr lang="en-US"/>
-            </a:p>
-          </p:txBody>
-        </p:sp>
-        <p:sp>
-          <p:nvSpPr>
-            <p:cNvPr id="54" name="Rectangle 66">
-              <a:extLst>
-                <a:ext uri="{FF2B5EF4-FFF2-40B4-BE49-F238E27FC236}">
-                  <a16:creationId xmlns:a16="http://schemas.microsoft.com/office/drawing/2014/main" id="{A0DEE160-9825-4DB5-8188-911AC13EA761}"/>
-                </a:ext>
-                <a:ext uri="{C183D7F6-B498-43B3-948B-1728B52AA6E4}">
-                  <adec:decorative xmlns:adec="http://schemas.microsoft.com/office/drawing/2017/decorative" val="1"/>
-                </a:ext>
-              </a:extLst>
-            </p:cNvPr>
-            <p:cNvSpPr/>
-            <p:nvPr>
-              <p:extLst>
-                <p:ext uri="{386F3935-93C4-4BCD-93E2-E3B085C9AB24}">
-                  <p16:designElem xmlns:p16="http://schemas.microsoft.com/office/powerpoint/2015/main" val="1"/>
-                </p:ext>
-              </p:extLst>
-            </p:nvPr>
-          </p:nvSpPr>
-          <p:spPr>
-            <a:xfrm>
-              <a:off x="8263077" y="246888"/>
-              <a:ext cx="54368" cy="59227"/>
-            </a:xfrm>
-            <a:prstGeom prst="ellipse">
-              <a:avLst/>
-            </a:prstGeom>
-            <a:solidFill>
-              <a:schemeClr val="accent1"/>
-            </a:solidFill>
-            <a:ln>
-              <a:noFill/>
-            </a:ln>
-          </p:spPr>
-          <p:style>
-            <a:lnRef idx="2">
-              <a:schemeClr val="accent1">
-                <a:shade val="50000"/>
-              </a:schemeClr>
-            </a:lnRef>
-            <a:fillRef idx="1">
-              <a:schemeClr val="accent1"/>
-            </a:fillRef>
-            <a:effectRef idx="0">
-              <a:schemeClr val="accent1"/>
-            </a:effectRef>
-            <a:fontRef idx="minor">
-              <a:schemeClr val="lt1"/>
-            </a:fontRef>
-          </p:style>
-          <p:txBody>
-            <a:bodyPr rtlCol="0" anchor="ctr"/>
-            <a:lstStyle/>
-            <a:p>
-              <a:pPr algn="ctr"/>
-              <a:endParaRPr lang="en-US"/>
-            </a:p>
-          </p:txBody>
-        </p:sp>
-        <p:sp>
-          <p:nvSpPr>
-            <p:cNvPr id="55" name="Rectangle 64">
-              <a:extLst>
-                <a:ext uri="{FF2B5EF4-FFF2-40B4-BE49-F238E27FC236}">
-                  <a16:creationId xmlns:a16="http://schemas.microsoft.com/office/drawing/2014/main" id="{9C5FEDB5-0AEE-40E4-9CA6-6718B956D932}"/>
-                </a:ext>
-                <a:ext uri="{C183D7F6-B498-43B3-948B-1728B52AA6E4}">
-                  <adec:decorative xmlns:adec="http://schemas.microsoft.com/office/drawing/2017/decorative" val="1"/>
-                </a:ext>
-              </a:extLst>
-            </p:cNvPr>
-            <p:cNvSpPr/>
-            <p:nvPr>
-              <p:extLst>
-                <p:ext uri="{386F3935-93C4-4BCD-93E2-E3B085C9AB24}">
-                  <p16:designElem xmlns:p16="http://schemas.microsoft.com/office/powerpoint/2015/main" val="1"/>
-                </p:ext>
-              </p:extLst>
-            </p:nvPr>
-          </p:nvSpPr>
-          <p:spPr>
-            <a:xfrm>
-              <a:off x="8138122" y="73152"/>
-              <a:ext cx="54368" cy="59227"/>
-            </a:xfrm>
-            <a:prstGeom prst="ellipse">
-              <a:avLst/>
-            </a:prstGeom>
-            <a:solidFill>
-              <a:schemeClr val="accent1"/>
-            </a:solidFill>
-            <a:ln>
-              <a:noFill/>
-            </a:ln>
-          </p:spPr>
-          <p:style>
-            <a:lnRef idx="2">
-              <a:schemeClr val="accent1">
-                <a:shade val="50000"/>
-              </a:schemeClr>
-            </a:lnRef>
-            <a:fillRef idx="1">
-              <a:schemeClr val="accent1"/>
-            </a:fillRef>
-            <a:effectRef idx="0">
-              <a:schemeClr val="accent1"/>
-            </a:effectRef>
-            <a:fontRef idx="minor">
-              <a:schemeClr val="lt1"/>
-            </a:fontRef>
-          </p:style>
-          <p:txBody>
-            <a:bodyPr rtlCol="0" anchor="ctr"/>
-            <a:lstStyle/>
-            <a:p>
-              <a:pPr algn="ctr"/>
-              <a:endParaRPr lang="en-US"/>
-            </a:p>
-          </p:txBody>
-        </p:sp>
-        <p:sp>
-          <p:nvSpPr>
-            <p:cNvPr id="56" name="Rectangle 66">
-              <a:extLst>
-                <a:ext uri="{FF2B5EF4-FFF2-40B4-BE49-F238E27FC236}">
-                  <a16:creationId xmlns:a16="http://schemas.microsoft.com/office/drawing/2014/main" id="{1A11DF2D-1D4B-45DA-906B-2A1F84C99647}"/>
-                </a:ext>
-                <a:ext uri="{C183D7F6-B498-43B3-948B-1728B52AA6E4}">
-                  <adec:decorative xmlns:adec="http://schemas.microsoft.com/office/drawing/2017/decorative" val="1"/>
-                </a:ext>
-              </a:extLst>
-            </p:cNvPr>
-            <p:cNvSpPr/>
-            <p:nvPr>
-              <p:extLst>
-                <p:ext uri="{386F3935-93C4-4BCD-93E2-E3B085C9AB24}">
-                  <p16:designElem xmlns:p16="http://schemas.microsoft.com/office/powerpoint/2015/main" val="1"/>
-                </p:ext>
-              </p:extLst>
-            </p:nvPr>
-          </p:nvSpPr>
-          <p:spPr>
-            <a:xfrm>
-              <a:off x="8138122" y="246888"/>
-              <a:ext cx="54368" cy="59227"/>
-            </a:xfrm>
-            <a:prstGeom prst="ellipse">
-              <a:avLst/>
-            </a:prstGeom>
-            <a:solidFill>
-              <a:schemeClr val="accent1"/>
-            </a:solidFill>
-            <a:ln>
-              <a:noFill/>
-            </a:ln>
-          </p:spPr>
-          <p:style>
-            <a:lnRef idx="2">
-              <a:schemeClr val="accent1">
-                <a:shade val="50000"/>
-              </a:schemeClr>
-            </a:lnRef>
-            <a:fillRef idx="1">
-              <a:schemeClr val="accent1"/>
-            </a:fillRef>
-            <a:effectRef idx="0">
-              <a:schemeClr val="accent1"/>
-            </a:effectRef>
-            <a:fontRef idx="minor">
-              <a:schemeClr val="lt1"/>
-            </a:fontRef>
-          </p:style>
-          <p:txBody>
-            <a:bodyPr rtlCol="0" anchor="ctr"/>
-            <a:lstStyle/>
-            <a:p>
-              <a:pPr algn="ctr"/>
-              <a:endParaRPr lang="en-US"/>
-            </a:p>
-          </p:txBody>
-        </p:sp>
-        <p:sp>
-          <p:nvSpPr>
-            <p:cNvPr id="57" name="Rectangle 64">
-              <a:extLst>
-                <a:ext uri="{FF2B5EF4-FFF2-40B4-BE49-F238E27FC236}">
-                  <a16:creationId xmlns:a16="http://schemas.microsoft.com/office/drawing/2014/main" id="{B6A5BAC0-9806-4124-A584-7F924A6589C8}"/>
-                </a:ext>
-                <a:ext uri="{C183D7F6-B498-43B3-948B-1728B52AA6E4}">
-                  <adec:decorative xmlns:adec="http://schemas.microsoft.com/office/drawing/2017/decorative" val="1"/>
-                </a:ext>
-              </a:extLst>
-            </p:cNvPr>
-            <p:cNvSpPr/>
-            <p:nvPr>
-              <p:extLst>
-                <p:ext uri="{386F3935-93C4-4BCD-93E2-E3B085C9AB24}">
-                  <p16:designElem xmlns:p16="http://schemas.microsoft.com/office/powerpoint/2015/main" val="1"/>
-                </p:ext>
-              </p:extLst>
-            </p:nvPr>
-          </p:nvSpPr>
-          <p:spPr>
-            <a:xfrm>
-              <a:off x="8013167" y="73152"/>
-              <a:ext cx="54368" cy="59227"/>
-            </a:xfrm>
-            <a:prstGeom prst="ellipse">
-              <a:avLst/>
-            </a:prstGeom>
-            <a:solidFill>
-              <a:schemeClr val="accent1"/>
-            </a:solidFill>
-            <a:ln>
-              <a:noFill/>
-            </a:ln>
-          </p:spPr>
-          <p:style>
-            <a:lnRef idx="2">
-              <a:schemeClr val="accent1">
-                <a:shade val="50000"/>
-              </a:schemeClr>
-            </a:lnRef>
-            <a:fillRef idx="1">
-              <a:schemeClr val="accent1"/>
-            </a:fillRef>
-            <a:effectRef idx="0">
-              <a:schemeClr val="accent1"/>
-            </a:effectRef>
-            <a:fontRef idx="minor">
-              <a:schemeClr val="lt1"/>
-            </a:fontRef>
-          </p:style>
-          <p:txBody>
-            <a:bodyPr rtlCol="0" anchor="ctr"/>
-            <a:lstStyle/>
-            <a:p>
-              <a:pPr algn="ctr"/>
-              <a:endParaRPr lang="en-US"/>
-            </a:p>
-          </p:txBody>
-        </p:sp>
-        <p:sp>
-          <p:nvSpPr>
-            <p:cNvPr id="58" name="Rectangle 66">
-              <a:extLst>
-                <a:ext uri="{FF2B5EF4-FFF2-40B4-BE49-F238E27FC236}">
-                  <a16:creationId xmlns:a16="http://schemas.microsoft.com/office/drawing/2014/main" id="{A8F6BFA3-38BE-4F0A-94D9-EF0E6EA01A0B}"/>
-                </a:ext>
-                <a:ext uri="{C183D7F6-B498-43B3-948B-1728B52AA6E4}">
-                  <adec:decorative xmlns:adec="http://schemas.microsoft.com/office/drawing/2017/decorative" val="1"/>
-                </a:ext>
-              </a:extLst>
-            </p:cNvPr>
-            <p:cNvSpPr/>
-            <p:nvPr>
-              <p:extLst>
-                <p:ext uri="{386F3935-93C4-4BCD-93E2-E3B085C9AB24}">
-                  <p16:designElem xmlns:p16="http://schemas.microsoft.com/office/powerpoint/2015/main" val="1"/>
-                </p:ext>
-              </p:extLst>
-            </p:nvPr>
-          </p:nvSpPr>
-          <p:spPr>
-            <a:xfrm>
-              <a:off x="8013167" y="246888"/>
-              <a:ext cx="54368" cy="59227"/>
-            </a:xfrm>
-            <a:prstGeom prst="ellipse">
-              <a:avLst/>
-            </a:prstGeom>
-            <a:solidFill>
-              <a:schemeClr val="accent1"/>
-            </a:solidFill>
-            <a:ln>
-              <a:noFill/>
-            </a:ln>
-          </p:spPr>
-          <p:style>
-            <a:lnRef idx="2">
-              <a:schemeClr val="accent1">
-                <a:shade val="50000"/>
-              </a:schemeClr>
-            </a:lnRef>
-            <a:fillRef idx="1">
-              <a:schemeClr val="accent1"/>
-            </a:fillRef>
-            <a:effectRef idx="0">
-              <a:schemeClr val="accent1"/>
-            </a:effectRef>
-            <a:fontRef idx="minor">
-              <a:schemeClr val="lt1"/>
-            </a:fontRef>
-          </p:style>
-          <p:txBody>
-            <a:bodyPr rtlCol="0" anchor="ctr"/>
-            <a:lstStyle/>
-            <a:p>
-              <a:pPr algn="ctr"/>
-              <a:endParaRPr lang="en-US"/>
-            </a:p>
-          </p:txBody>
-        </p:sp>
-        <p:sp>
-          <p:nvSpPr>
-            <p:cNvPr id="59" name="Rectangle 64">
-              <a:extLst>
-                <a:ext uri="{FF2B5EF4-FFF2-40B4-BE49-F238E27FC236}">
-                  <a16:creationId xmlns:a16="http://schemas.microsoft.com/office/drawing/2014/main" id="{BE6BCF21-959F-419E-BCA4-B20AF92EF4F3}"/>
-                </a:ext>
-                <a:ext uri="{C183D7F6-B498-43B3-948B-1728B52AA6E4}">
-                  <adec:decorative xmlns:adec="http://schemas.microsoft.com/office/drawing/2017/decorative" val="1"/>
-                </a:ext>
-              </a:extLst>
-            </p:cNvPr>
-            <p:cNvSpPr/>
-            <p:nvPr>
-              <p:extLst>
-                <p:ext uri="{386F3935-93C4-4BCD-93E2-E3B085C9AB24}">
-                  <p16:designElem xmlns:p16="http://schemas.microsoft.com/office/powerpoint/2015/main" val="1"/>
-                </p:ext>
-              </p:extLst>
-            </p:nvPr>
-          </p:nvSpPr>
-          <p:spPr>
-            <a:xfrm>
-              <a:off x="7888211" y="73152"/>
-              <a:ext cx="54368" cy="59227"/>
-            </a:xfrm>
-            <a:prstGeom prst="ellipse">
-              <a:avLst/>
-            </a:prstGeom>
-            <a:solidFill>
-              <a:schemeClr val="accent1"/>
-            </a:solidFill>
-            <a:ln>
-              <a:noFill/>
-            </a:ln>
-          </p:spPr>
-          <p:style>
-            <a:lnRef idx="2">
-              <a:schemeClr val="accent1">
-                <a:shade val="50000"/>
-              </a:schemeClr>
-            </a:lnRef>
-            <a:fillRef idx="1">
-              <a:schemeClr val="accent1"/>
-            </a:fillRef>
-            <a:effectRef idx="0">
-              <a:schemeClr val="accent1"/>
-            </a:effectRef>
-            <a:fontRef idx="minor">
-              <a:schemeClr val="lt1"/>
-            </a:fontRef>
-          </p:style>
-          <p:txBody>
-            <a:bodyPr rtlCol="0" anchor="ctr"/>
-            <a:lstStyle/>
-            <a:p>
-              <a:pPr algn="ctr"/>
-              <a:endParaRPr lang="en-US"/>
-            </a:p>
-          </p:txBody>
-        </p:sp>
-        <p:sp>
-          <p:nvSpPr>
-            <p:cNvPr id="60" name="Rectangle 66">
-              <a:extLst>
-                <a:ext uri="{FF2B5EF4-FFF2-40B4-BE49-F238E27FC236}">
-                  <a16:creationId xmlns:a16="http://schemas.microsoft.com/office/drawing/2014/main" id="{54B6E037-E222-42EB-9AEB-C45EF2090AF6}"/>
-                </a:ext>
-                <a:ext uri="{C183D7F6-B498-43B3-948B-1728B52AA6E4}">
-                  <adec:decorative xmlns:adec="http://schemas.microsoft.com/office/drawing/2017/decorative" val="1"/>
-                </a:ext>
-              </a:extLst>
-            </p:cNvPr>
-            <p:cNvSpPr/>
-            <p:nvPr>
-              <p:extLst>
-                <p:ext uri="{386F3935-93C4-4BCD-93E2-E3B085C9AB24}">
-                  <p16:designElem xmlns:p16="http://schemas.microsoft.com/office/powerpoint/2015/main" val="1"/>
-                </p:ext>
-              </p:extLst>
-            </p:nvPr>
-          </p:nvSpPr>
-          <p:spPr>
-            <a:xfrm>
-              <a:off x="7888211" y="246888"/>
-              <a:ext cx="54368" cy="59227"/>
-            </a:xfrm>
-            <a:prstGeom prst="ellipse">
-              <a:avLst/>
-            </a:prstGeom>
-            <a:solidFill>
-              <a:schemeClr val="accent1"/>
-            </a:solidFill>
-            <a:ln>
-              <a:noFill/>
-            </a:ln>
-          </p:spPr>
-          <p:style>
-            <a:lnRef idx="2">
-              <a:schemeClr val="accent1">
-                <a:shade val="50000"/>
-              </a:schemeClr>
-            </a:lnRef>
-            <a:fillRef idx="1">
-              <a:schemeClr val="accent1"/>
-            </a:fillRef>
-            <a:effectRef idx="0">
-              <a:schemeClr val="accent1"/>
-            </a:effectRef>
-            <a:fontRef idx="minor">
-              <a:schemeClr val="lt1"/>
-            </a:fontRef>
-          </p:style>
-          <p:txBody>
-            <a:bodyPr rtlCol="0" anchor="ctr"/>
-            <a:lstStyle/>
-            <a:p>
-              <a:pPr algn="ctr"/>
-              <a:endParaRPr lang="en-US"/>
-            </a:p>
-          </p:txBody>
-        </p:sp>
-        <p:sp>
-          <p:nvSpPr>
-            <p:cNvPr id="61" name="Rectangle 64">
-              <a:extLst>
-                <a:ext uri="{FF2B5EF4-FFF2-40B4-BE49-F238E27FC236}">
-                  <a16:creationId xmlns:a16="http://schemas.microsoft.com/office/drawing/2014/main" id="{A0494426-372E-42B8-87E1-170F1B5969DF}"/>
-                </a:ext>
-                <a:ext uri="{C183D7F6-B498-43B3-948B-1728B52AA6E4}">
-                  <adec:decorative xmlns:adec="http://schemas.microsoft.com/office/drawing/2017/decorative" val="1"/>
-                </a:ext>
-              </a:extLst>
-            </p:cNvPr>
-            <p:cNvSpPr/>
-            <p:nvPr>
-              <p:extLst>
-                <p:ext uri="{386F3935-93C4-4BCD-93E2-E3B085C9AB24}">
-                  <p16:designElem xmlns:p16="http://schemas.microsoft.com/office/powerpoint/2015/main" val="1"/>
-                </p:ext>
-              </p:extLst>
-            </p:nvPr>
-          </p:nvSpPr>
-          <p:spPr>
-            <a:xfrm>
-              <a:off x="7763256" y="73152"/>
-              <a:ext cx="54368" cy="59227"/>
-            </a:xfrm>
-            <a:prstGeom prst="ellipse">
-              <a:avLst/>
-            </a:prstGeom>
-            <a:solidFill>
-              <a:schemeClr val="accent1"/>
-            </a:solidFill>
-            <a:ln>
-              <a:noFill/>
-            </a:ln>
-          </p:spPr>
-          <p:style>
-            <a:lnRef idx="2">
-              <a:schemeClr val="accent1">
-                <a:shade val="50000"/>
-              </a:schemeClr>
-            </a:lnRef>
-            <a:fillRef idx="1">
-              <a:schemeClr val="accent1"/>
-            </a:fillRef>
-            <a:effectRef idx="0">
-              <a:schemeClr val="accent1"/>
-            </a:effectRef>
-            <a:fontRef idx="minor">
-              <a:schemeClr val="lt1"/>
-            </a:fontRef>
-          </p:style>
-          <p:txBody>
-            <a:bodyPr rtlCol="0" anchor="ctr"/>
-            <a:lstStyle/>
-            <a:p>
-              <a:pPr algn="ctr"/>
-              <a:endParaRPr lang="en-US"/>
-            </a:p>
-          </p:txBody>
-        </p:sp>
-        <p:sp>
-          <p:nvSpPr>
-            <p:cNvPr id="62" name="Rectangle 66">
-              <a:extLst>
-                <a:ext uri="{FF2B5EF4-FFF2-40B4-BE49-F238E27FC236}">
-                  <a16:creationId xmlns:a16="http://schemas.microsoft.com/office/drawing/2014/main" id="{14DB5AB5-5D73-4375-8CF4-DF4B7A5D7F24}"/>
-                </a:ext>
-                <a:ext uri="{C183D7F6-B498-43B3-948B-1728B52AA6E4}">
-                  <adec:decorative xmlns:adec="http://schemas.microsoft.com/office/drawing/2017/decorative" val="1"/>
-                </a:ext>
-              </a:extLst>
-            </p:cNvPr>
-            <p:cNvSpPr/>
-            <p:nvPr>
-              <p:extLst>
-                <p:ext uri="{386F3935-93C4-4BCD-93E2-E3B085C9AB24}">
-                  <p16:designElem xmlns:p16="http://schemas.microsoft.com/office/powerpoint/2015/main" val="1"/>
-                </p:ext>
-              </p:extLst>
-            </p:nvPr>
-          </p:nvSpPr>
-          <p:spPr>
-            <a:xfrm>
-              <a:off x="7763256" y="246888"/>
-              <a:ext cx="54368" cy="59227"/>
-            </a:xfrm>
-            <a:prstGeom prst="ellipse">
-              <a:avLst/>
-            </a:prstGeom>
-            <a:solidFill>
-              <a:schemeClr val="accent1"/>
-            </a:solidFill>
-            <a:ln>
-              <a:noFill/>
-            </a:ln>
-          </p:spPr>
-          <p:style>
-            <a:lnRef idx="2">
-              <a:schemeClr val="accent1">
-                <a:shade val="50000"/>
-              </a:schemeClr>
-            </a:lnRef>
-            <a:fillRef idx="1">
-              <a:schemeClr val="accent1"/>
-            </a:fillRef>
-            <a:effectRef idx="0">
-              <a:schemeClr val="accent1"/>
-            </a:effectRef>
-            <a:fontRef idx="minor">
-              <a:schemeClr val="lt1"/>
-            </a:fontRef>
-          </p:style>
-          <p:txBody>
-            <a:bodyPr rtlCol="0" anchor="ctr"/>
-            <a:lstStyle/>
-            <a:p>
-              <a:pPr algn="ctr"/>
-              <a:endParaRPr lang="en-US"/>
-            </a:p>
-          </p:txBody>
-        </p:sp>
-        <p:sp>
-          <p:nvSpPr>
-            <p:cNvPr id="63" name="Rectangle 64">
-              <a:extLst>
-                <a:ext uri="{FF2B5EF4-FFF2-40B4-BE49-F238E27FC236}">
-                  <a16:creationId xmlns:a16="http://schemas.microsoft.com/office/drawing/2014/main" id="{009B2A6E-6D36-4A9A-AFAA-CF4D8591470D}"/>
-                </a:ext>
-                <a:ext uri="{C183D7F6-B498-43B3-948B-1728B52AA6E4}">
-                  <adec:decorative xmlns:adec="http://schemas.microsoft.com/office/drawing/2017/decorative" val="1"/>
-                </a:ext>
-              </a:extLst>
-            </p:cNvPr>
-            <p:cNvSpPr/>
-            <p:nvPr>
-              <p:extLst>
-                <p:ext uri="{386F3935-93C4-4BCD-93E2-E3B085C9AB24}">
-                  <p16:designElem xmlns:p16="http://schemas.microsoft.com/office/powerpoint/2015/main" val="1"/>
-                </p:ext>
-              </p:extLst>
-            </p:nvPr>
-          </p:nvSpPr>
-          <p:spPr>
-            <a:xfrm>
-              <a:off x="8887854" y="73152"/>
-              <a:ext cx="54368" cy="59227"/>
-            </a:xfrm>
-            <a:prstGeom prst="ellipse">
-              <a:avLst/>
-            </a:prstGeom>
-            <a:solidFill>
-              <a:schemeClr val="accent1"/>
-            </a:solidFill>
-            <a:ln>
-              <a:noFill/>
-            </a:ln>
-          </p:spPr>
-          <p:style>
-            <a:lnRef idx="2">
-              <a:schemeClr val="accent1">
-                <a:shade val="50000"/>
-              </a:schemeClr>
-            </a:lnRef>
-            <a:fillRef idx="1">
-              <a:schemeClr val="accent1"/>
-            </a:fillRef>
-            <a:effectRef idx="0">
-              <a:schemeClr val="accent1"/>
-            </a:effectRef>
-            <a:fontRef idx="minor">
-              <a:schemeClr val="lt1"/>
-            </a:fontRef>
-          </p:style>
-          <p:txBody>
-            <a:bodyPr rtlCol="0" anchor="ctr"/>
-            <a:lstStyle/>
-            <a:p>
-              <a:pPr algn="ctr"/>
-              <a:endParaRPr lang="en-US"/>
-            </a:p>
-          </p:txBody>
-        </p:sp>
-        <p:sp>
-          <p:nvSpPr>
-            <p:cNvPr id="64" name="Rectangle 66">
-              <a:extLst>
-                <a:ext uri="{FF2B5EF4-FFF2-40B4-BE49-F238E27FC236}">
-                  <a16:creationId xmlns:a16="http://schemas.microsoft.com/office/drawing/2014/main" id="{85DC0718-B29F-47A6-931F-F0EF9FA995D9}"/>
-                </a:ext>
-                <a:ext uri="{C183D7F6-B498-43B3-948B-1728B52AA6E4}">
-                  <adec:decorative xmlns:adec="http://schemas.microsoft.com/office/drawing/2017/decorative" val="1"/>
-                </a:ext>
-              </a:extLst>
-            </p:cNvPr>
-            <p:cNvSpPr/>
-            <p:nvPr>
-              <p:extLst>
-                <p:ext uri="{386F3935-93C4-4BCD-93E2-E3B085C9AB24}">
-                  <p16:designElem xmlns:p16="http://schemas.microsoft.com/office/powerpoint/2015/main" val="1"/>
-                </p:ext>
-              </p:extLst>
-            </p:nvPr>
-          </p:nvSpPr>
-          <p:spPr>
-            <a:xfrm>
-              <a:off x="8887854" y="246888"/>
-              <a:ext cx="54368" cy="59227"/>
-            </a:xfrm>
-            <a:prstGeom prst="ellipse">
-              <a:avLst/>
-            </a:prstGeom>
-            <a:solidFill>
-              <a:schemeClr val="accent1"/>
-            </a:solidFill>
-            <a:ln>
-              <a:noFill/>
-            </a:ln>
-          </p:spPr>
-          <p:style>
-            <a:lnRef idx="2">
-              <a:schemeClr val="accent1">
-                <a:shade val="50000"/>
-              </a:schemeClr>
-            </a:lnRef>
-            <a:fillRef idx="1">
-              <a:schemeClr val="accent1"/>
-            </a:fillRef>
-            <a:effectRef idx="0">
-              <a:schemeClr val="accent1"/>
-            </a:effectRef>
-            <a:fontRef idx="minor">
-              <a:schemeClr val="lt1"/>
-            </a:fontRef>
-          </p:style>
-          <p:txBody>
-            <a:bodyPr rtlCol="0" anchor="ctr"/>
-            <a:lstStyle/>
-            <a:p>
-              <a:pPr algn="ctr"/>
-              <a:endParaRPr lang="en-US"/>
-            </a:p>
-          </p:txBody>
-        </p:sp>
-        <p:sp>
-          <p:nvSpPr>
-            <p:cNvPr id="65" name="Rectangle 64">
-              <a:extLst>
-                <a:ext uri="{FF2B5EF4-FFF2-40B4-BE49-F238E27FC236}">
-                  <a16:creationId xmlns:a16="http://schemas.microsoft.com/office/drawing/2014/main" id="{AAED958D-AFCC-4BEF-818A-EFF7E41D1752}"/>
-                </a:ext>
-                <a:ext uri="{C183D7F6-B498-43B3-948B-1728B52AA6E4}">
-                  <adec:decorative xmlns:adec="http://schemas.microsoft.com/office/drawing/2017/decorative" val="1"/>
-                </a:ext>
-              </a:extLst>
-            </p:cNvPr>
-            <p:cNvSpPr/>
-            <p:nvPr>
-              <p:extLst>
-                <p:ext uri="{386F3935-93C4-4BCD-93E2-E3B085C9AB24}">
-                  <p16:designElem xmlns:p16="http://schemas.microsoft.com/office/powerpoint/2015/main" val="1"/>
-                </p:ext>
-              </p:extLst>
-            </p:nvPr>
-          </p:nvSpPr>
-          <p:spPr>
-            <a:xfrm>
-              <a:off x="8762899" y="73152"/>
-              <a:ext cx="54368" cy="59227"/>
-            </a:xfrm>
-            <a:prstGeom prst="ellipse">
-              <a:avLst/>
-            </a:prstGeom>
-            <a:solidFill>
-              <a:schemeClr val="accent1"/>
-            </a:solidFill>
-            <a:ln>
-              <a:noFill/>
-            </a:ln>
-          </p:spPr>
-          <p:style>
-            <a:lnRef idx="2">
-              <a:schemeClr val="accent1">
-                <a:shade val="50000"/>
-              </a:schemeClr>
-            </a:lnRef>
-            <a:fillRef idx="1">
-              <a:schemeClr val="accent1"/>
-            </a:fillRef>
-            <a:effectRef idx="0">
-              <a:schemeClr val="accent1"/>
-            </a:effectRef>
-            <a:fontRef idx="minor">
-              <a:schemeClr val="lt1"/>
-            </a:fontRef>
-          </p:style>
-          <p:txBody>
-            <a:bodyPr rtlCol="0" anchor="ctr"/>
-            <a:lstStyle/>
-            <a:p>
-              <a:pPr algn="ctr"/>
-              <a:endParaRPr lang="en-US"/>
-            </a:p>
-          </p:txBody>
-        </p:sp>
-        <p:sp>
-          <p:nvSpPr>
-            <p:cNvPr id="66" name="Rectangle 66">
-              <a:extLst>
-                <a:ext uri="{FF2B5EF4-FFF2-40B4-BE49-F238E27FC236}">
-                  <a16:creationId xmlns:a16="http://schemas.microsoft.com/office/drawing/2014/main" id="{C216DD5A-D1AE-429E-937E-456A50345E2F}"/>
-                </a:ext>
-                <a:ext uri="{C183D7F6-B498-43B3-948B-1728B52AA6E4}">
-                  <adec:decorative xmlns:adec="http://schemas.microsoft.com/office/drawing/2017/decorative" val="1"/>
-                </a:ext>
-              </a:extLst>
-            </p:cNvPr>
-            <p:cNvSpPr/>
-            <p:nvPr>
-              <p:extLst>
-                <p:ext uri="{386F3935-93C4-4BCD-93E2-E3B085C9AB24}">
-                  <p16:designElem xmlns:p16="http://schemas.microsoft.com/office/powerpoint/2015/main" val="1"/>
-                </p:ext>
-              </p:extLst>
-            </p:nvPr>
-          </p:nvSpPr>
-          <p:spPr>
-            <a:xfrm>
-              <a:off x="8762899" y="246888"/>
-              <a:ext cx="54368" cy="59227"/>
-            </a:xfrm>
-            <a:prstGeom prst="ellipse">
-              <a:avLst/>
-            </a:prstGeom>
-            <a:solidFill>
-              <a:schemeClr val="accent1"/>
-            </a:solidFill>
-            <a:ln>
-              <a:noFill/>
-            </a:ln>
-          </p:spPr>
-          <p:style>
-            <a:lnRef idx="2">
-              <a:schemeClr val="accent1">
-                <a:shade val="50000"/>
-              </a:schemeClr>
-            </a:lnRef>
-            <a:fillRef idx="1">
-              <a:schemeClr val="accent1"/>
-            </a:fillRef>
-            <a:effectRef idx="0">
-              <a:schemeClr val="accent1"/>
-            </a:effectRef>
-            <a:fontRef idx="minor">
-              <a:schemeClr val="lt1"/>
-            </a:fontRef>
-          </p:style>
-          <p:txBody>
-            <a:bodyPr rtlCol="0" anchor="ctr"/>
-            <a:lstStyle/>
-            <a:p>
-              <a:pPr algn="ctr"/>
-              <a:endParaRPr lang="en-US"/>
-            </a:p>
-          </p:txBody>
-        </p:sp>
-        <p:sp>
-          <p:nvSpPr>
-            <p:cNvPr id="67" name="Rectangle 64">
-              <a:extLst>
-                <a:ext uri="{FF2B5EF4-FFF2-40B4-BE49-F238E27FC236}">
-                  <a16:creationId xmlns:a16="http://schemas.microsoft.com/office/drawing/2014/main" id="{A845B253-9DEE-45AC-AADA-FAA6812C3968}"/>
-                </a:ext>
-                <a:ext uri="{C183D7F6-B498-43B3-948B-1728B52AA6E4}">
-                  <adec:decorative xmlns:adec="http://schemas.microsoft.com/office/drawing/2017/decorative" val="1"/>
-                </a:ext>
-              </a:extLst>
-            </p:cNvPr>
-            <p:cNvSpPr/>
-            <p:nvPr>
-              <p:extLst>
-                <p:ext uri="{386F3935-93C4-4BCD-93E2-E3B085C9AB24}">
-                  <p16:designElem xmlns:p16="http://schemas.microsoft.com/office/powerpoint/2015/main" val="1"/>
-                </p:ext>
-              </p:extLst>
-            </p:nvPr>
-          </p:nvSpPr>
-          <p:spPr>
-            <a:xfrm>
-              <a:off x="8637944" y="73152"/>
-              <a:ext cx="54368" cy="59227"/>
-            </a:xfrm>
-            <a:prstGeom prst="ellipse">
-              <a:avLst/>
-            </a:prstGeom>
-            <a:solidFill>
-              <a:schemeClr val="accent1"/>
-            </a:solidFill>
-            <a:ln>
-              <a:noFill/>
-            </a:ln>
-          </p:spPr>
-          <p:style>
-            <a:lnRef idx="2">
-              <a:schemeClr val="accent1">
-                <a:shade val="50000"/>
-              </a:schemeClr>
-            </a:lnRef>
-            <a:fillRef idx="1">
-              <a:schemeClr val="accent1"/>
-            </a:fillRef>
-            <a:effectRef idx="0">
-              <a:schemeClr val="accent1"/>
-            </a:effectRef>
-            <a:fontRef idx="minor">
-              <a:schemeClr val="lt1"/>
-            </a:fontRef>
-          </p:style>
-          <p:txBody>
-            <a:bodyPr rtlCol="0" anchor="ctr"/>
-            <a:lstStyle/>
-            <a:p>
-              <a:pPr algn="ctr"/>
-              <a:endParaRPr lang="en-US"/>
-            </a:p>
-          </p:txBody>
-        </p:sp>
-        <p:sp>
-          <p:nvSpPr>
-            <p:cNvPr id="68" name="Rectangle 66">
-              <a:extLst>
-                <a:ext uri="{FF2B5EF4-FFF2-40B4-BE49-F238E27FC236}">
-                  <a16:creationId xmlns:a16="http://schemas.microsoft.com/office/drawing/2014/main" id="{CE7B6CBF-757B-4B55-84CB-062B712D38EE}"/>
-                </a:ext>
-                <a:ext uri="{C183D7F6-B498-43B3-948B-1728B52AA6E4}">
-                  <adec:decorative xmlns:adec="http://schemas.microsoft.com/office/drawing/2017/decorative" val="1"/>
-                </a:ext>
-              </a:extLst>
-            </p:cNvPr>
-            <p:cNvSpPr/>
-            <p:nvPr>
-              <p:extLst>
-                <p:ext uri="{386F3935-93C4-4BCD-93E2-E3B085C9AB24}">
-                  <p16:designElem xmlns:p16="http://schemas.microsoft.com/office/powerpoint/2015/main" val="1"/>
-                </p:ext>
-              </p:extLst>
-            </p:nvPr>
-          </p:nvSpPr>
-          <p:spPr>
-            <a:xfrm>
-              <a:off x="8637944" y="246888"/>
-              <a:ext cx="54368" cy="59227"/>
-            </a:xfrm>
-            <a:prstGeom prst="ellipse">
-              <a:avLst/>
-            </a:prstGeom>
-            <a:solidFill>
-              <a:schemeClr val="accent1"/>
-            </a:solidFill>
-            <a:ln>
-              <a:noFill/>
-            </a:ln>
-          </p:spPr>
-          <p:style>
-            <a:lnRef idx="2">
-              <a:schemeClr val="accent1">
-                <a:shade val="50000"/>
-              </a:schemeClr>
-            </a:lnRef>
-            <a:fillRef idx="1">
-              <a:schemeClr val="accent1"/>
-            </a:fillRef>
-            <a:effectRef idx="0">
-              <a:schemeClr val="accent1"/>
-            </a:effectRef>
-            <a:fontRef idx="minor">
-              <a:schemeClr val="lt1"/>
-            </a:fontRef>
-          </p:style>
-          <p:txBody>
-            <a:bodyPr rtlCol="0" anchor="ctr"/>
-            <a:lstStyle/>
-            <a:p>
-              <a:pPr algn="ctr"/>
-              <a:endParaRPr lang="en-US"/>
-            </a:p>
-          </p:txBody>
-        </p:sp>
-        <p:sp>
-          <p:nvSpPr>
-            <p:cNvPr id="69" name="Rectangle 64">
-              <a:extLst>
-                <a:ext uri="{FF2B5EF4-FFF2-40B4-BE49-F238E27FC236}">
-                  <a16:creationId xmlns:a16="http://schemas.microsoft.com/office/drawing/2014/main" id="{2CC28C7A-EF33-43D3-90CD-DCAC92546A11}"/>
-                </a:ext>
-                <a:ext uri="{C183D7F6-B498-43B3-948B-1728B52AA6E4}">
-                  <adec:decorative xmlns:adec="http://schemas.microsoft.com/office/drawing/2017/decorative" val="1"/>
-                </a:ext>
-              </a:extLst>
-            </p:cNvPr>
-            <p:cNvSpPr/>
-            <p:nvPr>
-              <p:extLst>
-                <p:ext uri="{386F3935-93C4-4BCD-93E2-E3B085C9AB24}">
-                  <p16:designElem xmlns:p16="http://schemas.microsoft.com/office/powerpoint/2015/main" val="1"/>
-                </p:ext>
-              </p:extLst>
-            </p:nvPr>
-          </p:nvSpPr>
-          <p:spPr>
-            <a:xfrm>
-              <a:off x="8512988" y="73152"/>
-              <a:ext cx="54368" cy="59227"/>
-            </a:xfrm>
-            <a:prstGeom prst="ellipse">
-              <a:avLst/>
-            </a:prstGeom>
-            <a:solidFill>
-              <a:schemeClr val="accent1"/>
-            </a:solidFill>
-            <a:ln>
-              <a:noFill/>
-            </a:ln>
-          </p:spPr>
-          <p:style>
-            <a:lnRef idx="2">
-              <a:schemeClr val="accent1">
-                <a:shade val="50000"/>
-              </a:schemeClr>
-            </a:lnRef>
-            <a:fillRef idx="1">
-              <a:schemeClr val="accent1"/>
-            </a:fillRef>
-            <a:effectRef idx="0">
-              <a:schemeClr val="accent1"/>
-            </a:effectRef>
-            <a:fontRef idx="minor">
-              <a:schemeClr val="lt1"/>
-            </a:fontRef>
-          </p:style>
-          <p:txBody>
-            <a:bodyPr rtlCol="0" anchor="ctr"/>
-            <a:lstStyle/>
-            <a:p>
-              <a:pPr algn="ctr"/>
-              <a:endParaRPr lang="en-US"/>
-            </a:p>
-          </p:txBody>
-        </p:sp>
-        <p:sp>
-          <p:nvSpPr>
-            <p:cNvPr id="70" name="Rectangle 66">
-              <a:extLst>
-                <a:ext uri="{FF2B5EF4-FFF2-40B4-BE49-F238E27FC236}">
-                  <a16:creationId xmlns:a16="http://schemas.microsoft.com/office/drawing/2014/main" id="{BC0C9DCF-F15B-4B7A-A16B-37B4335E6BD2}"/>
-                </a:ext>
-                <a:ext uri="{C183D7F6-B498-43B3-948B-1728B52AA6E4}">
-                  <adec:decorative xmlns:adec="http://schemas.microsoft.com/office/drawing/2017/decorative" val="1"/>
-                </a:ext>
-              </a:extLst>
-            </p:cNvPr>
-            <p:cNvSpPr/>
-            <p:nvPr>
-              <p:extLst>
-                <p:ext uri="{386F3935-93C4-4BCD-93E2-E3B085C9AB24}">
-                  <p16:designElem xmlns:p16="http://schemas.microsoft.com/office/powerpoint/2015/main" val="1"/>
-                </p:ext>
-              </p:extLst>
-            </p:nvPr>
-          </p:nvSpPr>
-          <p:spPr>
-            <a:xfrm>
-              <a:off x="8512988" y="246888"/>
-              <a:ext cx="54368" cy="59227"/>
-            </a:xfrm>
-            <a:prstGeom prst="ellipse">
-              <a:avLst/>
-            </a:prstGeom>
-            <a:solidFill>
-              <a:schemeClr val="accent1"/>
-            </a:solidFill>
-            <a:ln>
-              <a:noFill/>
-            </a:ln>
-          </p:spPr>
-          <p:style>
-            <a:lnRef idx="2">
-              <a:schemeClr val="accent1">
-                <a:shade val="50000"/>
-              </a:schemeClr>
-            </a:lnRef>
-            <a:fillRef idx="1">
-              <a:schemeClr val="accent1"/>
-            </a:fillRef>
-            <a:effectRef idx="0">
-              <a:schemeClr val="accent1"/>
-            </a:effectRef>
-            <a:fontRef idx="minor">
-              <a:schemeClr val="lt1"/>
-            </a:fontRef>
-          </p:style>
-          <p:txBody>
-            <a:bodyPr rtlCol="0" anchor="ctr"/>
-            <a:lstStyle/>
-            <a:p>
-              <a:pPr algn="ctr"/>
-              <a:endParaRPr lang="en-US"/>
-            </a:p>
-          </p:txBody>
-        </p:sp>
-        <p:sp>
-          <p:nvSpPr>
-            <p:cNvPr id="71" name="Rectangle 64">
-              <a:extLst>
-                <a:ext uri="{FF2B5EF4-FFF2-40B4-BE49-F238E27FC236}">
-                  <a16:creationId xmlns:a16="http://schemas.microsoft.com/office/drawing/2014/main" id="{94991FD1-406A-4958-87D4-8DFA9FEA4C01}"/>
-                </a:ext>
-                <a:ext uri="{C183D7F6-B498-43B3-948B-1728B52AA6E4}">
-                  <adec:decorative xmlns:adec="http://schemas.microsoft.com/office/drawing/2017/decorative" val="1"/>
-                </a:ext>
-              </a:extLst>
-            </p:cNvPr>
-            <p:cNvSpPr/>
-            <p:nvPr>
-              <p:extLst>
-                <p:ext uri="{386F3935-93C4-4BCD-93E2-E3B085C9AB24}">
-                  <p16:designElem xmlns:p16="http://schemas.microsoft.com/office/powerpoint/2015/main" val="1"/>
-                </p:ext>
-              </p:extLst>
-            </p:nvPr>
-          </p:nvSpPr>
-          <p:spPr>
-            <a:xfrm>
-              <a:off x="8388033" y="73152"/>
-              <a:ext cx="54368" cy="59227"/>
-            </a:xfrm>
-            <a:prstGeom prst="ellipse">
-              <a:avLst/>
-            </a:prstGeom>
-            <a:solidFill>
-              <a:schemeClr val="accent1"/>
-            </a:solidFill>
-            <a:ln>
-              <a:noFill/>
-            </a:ln>
-          </p:spPr>
-          <p:style>
-            <a:lnRef idx="2">
-              <a:schemeClr val="accent1">
-                <a:shade val="50000"/>
-              </a:schemeClr>
-            </a:lnRef>
-            <a:fillRef idx="1">
-              <a:schemeClr val="accent1"/>
-            </a:fillRef>
-            <a:effectRef idx="0">
-              <a:schemeClr val="accent1"/>
-            </a:effectRef>
-            <a:fontRef idx="minor">
-              <a:schemeClr val="lt1"/>
-            </a:fontRef>
-          </p:style>
-          <p:txBody>
-            <a:bodyPr rtlCol="0" anchor="ctr"/>
-            <a:lstStyle/>
-            <a:p>
-              <a:pPr algn="ctr"/>
-              <a:endParaRPr lang="en-US"/>
-            </a:p>
-          </p:txBody>
-        </p:sp>
-        <p:sp>
-          <p:nvSpPr>
-            <p:cNvPr id="72" name="Rectangle 66">
-              <a:extLst>
-                <a:ext uri="{FF2B5EF4-FFF2-40B4-BE49-F238E27FC236}">
-                  <a16:creationId xmlns:a16="http://schemas.microsoft.com/office/drawing/2014/main" id="{5CD32F69-27AD-4088-877C-E2A40F8B0733}"/>
-                </a:ext>
-                <a:ext uri="{C183D7F6-B498-43B3-948B-1728B52AA6E4}">
-                  <adec:decorative xmlns:adec="http://schemas.microsoft.com/office/drawing/2017/decorative" val="1"/>
-                </a:ext>
-              </a:extLst>
-            </p:cNvPr>
-            <p:cNvSpPr/>
-            <p:nvPr>
-              <p:extLst>
-                <p:ext uri="{386F3935-93C4-4BCD-93E2-E3B085C9AB24}">
-                  <p16:designElem xmlns:p16="http://schemas.microsoft.com/office/powerpoint/2015/main" val="1"/>
-                </p:ext>
-              </p:extLst>
-            </p:nvPr>
-          </p:nvSpPr>
-          <p:spPr>
-            <a:xfrm>
-              <a:off x="8388033" y="246888"/>
-              <a:ext cx="54368" cy="59227"/>
-            </a:xfrm>
-            <a:prstGeom prst="ellipse">
-              <a:avLst/>
-            </a:prstGeom>
-            <a:solidFill>
-              <a:schemeClr val="accent1"/>
-            </a:solidFill>
-            <a:ln>
-              <a:noFill/>
-            </a:ln>
-          </p:spPr>
-          <p:style>
-            <a:lnRef idx="2">
-              <a:schemeClr val="accent1">
-                <a:shade val="50000"/>
-              </a:schemeClr>
-            </a:lnRef>
-            <a:fillRef idx="1">
-              <a:schemeClr val="accent1"/>
-            </a:fillRef>
-            <a:effectRef idx="0">
-              <a:schemeClr val="accent1"/>
-            </a:effectRef>
-            <a:fontRef idx="minor">
-              <a:schemeClr val="lt1"/>
-            </a:fontRef>
-          </p:style>
-          <p:txBody>
-            <a:bodyPr rtlCol="0" anchor="ctr"/>
-            <a:lstStyle/>
-            <a:p>
-              <a:pPr algn="ctr"/>
-              <a:endParaRPr lang="en-US"/>
-            </a:p>
-          </p:txBody>
-        </p:sp>
-      </p:grpSp>
-      <p:pic>
-        <p:nvPicPr>
-          <p:cNvPr id="43" name="Picture 42" descr="Chart, histogram&#10;&#10;Description automatically generated">
-            <a:extLst>
-              <a:ext uri="{FF2B5EF4-FFF2-40B4-BE49-F238E27FC236}">
-                <a16:creationId xmlns:a16="http://schemas.microsoft.com/office/drawing/2014/main" id="{72579495-CCE2-489F-88CA-556BAB6D2236}"/>
+                <a16:creationId xmlns:a16="http://schemas.microsoft.com/office/drawing/2014/main" id="{AA5B4773-E470-455C-ACD4-A866F21F9068}"/>
               </a:ext>
             </a:extLst>
           </p:cNvPr>
@@ -14042,96 +12900,27 @@
           <p:nvPr/>
         </p:nvPicPr>
         <p:blipFill>
-          <a:blip r:embed="rId2">
-            <a:extLst>
-              <a:ext uri="{28A0092B-C50C-407E-A947-70E740481C1C}">
-                <a14:useLocalDpi xmlns:a14="http://schemas.microsoft.com/office/drawing/2010/main" val="0"/>
-              </a:ext>
-            </a:extLst>
-          </a:blip>
+          <a:blip r:embed="rId2"/>
           <a:stretch>
             <a:fillRect/>
           </a:stretch>
         </p:blipFill>
         <p:spPr>
           <a:xfrm>
-            <a:off x="6479838" y="3703335"/>
-            <a:ext cx="5586942" cy="2670460"/>
+            <a:off x="393308" y="2805550"/>
+            <a:ext cx="5559480" cy="3185769"/>
           </a:xfrm>
           <a:prstGeom prst="rect">
             <a:avLst/>
           </a:prstGeom>
         </p:spPr>
       </p:pic>
-      <p:sp>
-        <p:nvSpPr>
-          <p:cNvPr id="74" name="Rectangle 73">
+      <p:pic>
+        <p:nvPicPr>
+          <p:cNvPr id="2" name="Picture 3" descr="Chart, line chart&#10;&#10;Description automatically generated">
             <a:extLst>
               <a:ext uri="{FF2B5EF4-FFF2-40B4-BE49-F238E27FC236}">
-                <a16:creationId xmlns:a16="http://schemas.microsoft.com/office/drawing/2014/main" id="{D9F5512A-48E1-4C07-B75E-3CCC517B6804}"/>
-              </a:ext>
-              <a:ext uri="{C183D7F6-B498-43B3-948B-1728B52AA6E4}">
-                <adec:decorative xmlns:adec="http://schemas.microsoft.com/office/drawing/2017/decorative" val="1"/>
-              </a:ext>
-            </a:extLst>
-          </p:cNvPr>
-          <p:cNvSpPr>
-            <a:spLocks noGrp="1" noRot="1" noChangeAspect="1" noMove="1" noResize="1" noEditPoints="1" noAdjustHandles="1" noChangeArrowheads="1" noChangeShapeType="1" noTextEdit="1"/>
-          </p:cNvSpPr>
-          <p:nvPr>
-            <p:extLst>
-              <p:ext uri="{386F3935-93C4-4BCD-93E2-E3B085C9AB24}">
-                <p16:designElem xmlns:p16="http://schemas.microsoft.com/office/powerpoint/2015/main" val="1"/>
-              </p:ext>
-            </p:extLst>
-          </p:nvPr>
-        </p:nvSpPr>
-        <p:spPr>
-          <a:xfrm>
-            <a:off x="-1" y="3233984"/>
-            <a:ext cx="606972" cy="3624015"/>
-          </a:xfrm>
-          <a:prstGeom prst="rect">
-            <a:avLst/>
-          </a:prstGeom>
-          <a:solidFill>
-            <a:schemeClr val="accent1"/>
-          </a:solidFill>
-          <a:ln>
-            <a:noFill/>
-          </a:ln>
-        </p:spPr>
-        <p:style>
-          <a:lnRef idx="2">
-            <a:schemeClr val="accent1">
-              <a:shade val="50000"/>
-            </a:schemeClr>
-          </a:lnRef>
-          <a:fillRef idx="1">
-            <a:schemeClr val="accent1"/>
-          </a:fillRef>
-          <a:effectRef idx="0">
-            <a:schemeClr val="accent1"/>
-          </a:effectRef>
-          <a:fontRef idx="minor">
-            <a:schemeClr val="lt1"/>
-          </a:fontRef>
-        </p:style>
-        <p:txBody>
-          <a:bodyPr rtlCol="0" anchor="ctr"/>
-          <a:lstStyle/>
-          <a:p>
-            <a:pPr algn="ctr"/>
-            <a:endParaRPr lang="en-US"/>
-          </a:p>
-        </p:txBody>
-      </p:sp>
-      <p:pic>
-        <p:nvPicPr>
-          <p:cNvPr id="33" name="Picture 32" descr="Chart, bar chart, histogram&#10;&#10;Description automatically generated">
-            <a:extLst>
-              <a:ext uri="{FF2B5EF4-FFF2-40B4-BE49-F238E27FC236}">
-                <a16:creationId xmlns:a16="http://schemas.microsoft.com/office/drawing/2014/main" id="{E0887932-9F33-4CD2-B65A-3FF20042F2B4}"/>
+                <a16:creationId xmlns:a16="http://schemas.microsoft.com/office/drawing/2014/main" id="{9A47D368-D2F1-4DE4-85B7-FF3287C15002}"/>
               </a:ext>
             </a:extLst>
           </p:cNvPr>
@@ -14141,57 +12930,15 @@
           <p:nvPr/>
         </p:nvPicPr>
         <p:blipFill>
-          <a:blip r:embed="rId3">
-            <a:extLst>
-              <a:ext uri="{28A0092B-C50C-407E-A947-70E740481C1C}">
-                <a14:useLocalDpi xmlns:a14="http://schemas.microsoft.com/office/drawing/2010/main" val="0"/>
-              </a:ext>
-            </a:extLst>
-          </a:blip>
+          <a:blip r:embed="rId3"/>
           <a:stretch>
             <a:fillRect/>
           </a:stretch>
         </p:blipFill>
         <p:spPr>
           <a:xfrm>
-            <a:off x="749204" y="3703334"/>
-            <a:ext cx="5586942" cy="2670459"/>
-          </a:xfrm>
-          <a:prstGeom prst="rect">
-            <a:avLst/>
-          </a:prstGeom>
-        </p:spPr>
-      </p:pic>
-      <p:pic>
-        <p:nvPicPr>
-          <p:cNvPr id="3" name="Picture 2" descr="Chart&#10;&#10;Description automatically generated">
-            <a:extLst>
-              <a:ext uri="{FF2B5EF4-FFF2-40B4-BE49-F238E27FC236}">
-                <a16:creationId xmlns:a16="http://schemas.microsoft.com/office/drawing/2014/main" id="{5E2FE346-F668-4214-A804-A8FC1C339B7E}"/>
-              </a:ext>
-            </a:extLst>
-          </p:cNvPr>
-          <p:cNvPicPr>
-            <a:picLocks noChangeAspect="1"/>
-          </p:cNvPicPr>
-          <p:nvPr/>
-        </p:nvPicPr>
-        <p:blipFill>
-          <a:blip r:embed="rId4">
-            <a:extLst>
-              <a:ext uri="{28A0092B-C50C-407E-A947-70E740481C1C}">
-                <a14:useLocalDpi xmlns:a14="http://schemas.microsoft.com/office/drawing/2010/main" val="0"/>
-              </a:ext>
-            </a:extLst>
-          </a:blip>
-          <a:stretch>
-            <a:fillRect/>
-          </a:stretch>
-        </p:blipFill>
-        <p:spPr>
-          <a:xfrm>
-            <a:off x="6605058" y="706322"/>
-            <a:ext cx="5586942" cy="2512805"/>
+            <a:off x="6251736" y="2813221"/>
+            <a:ext cx="5546955" cy="3178591"/>
           </a:xfrm>
           <a:prstGeom prst="rect">
             <a:avLst/>
@@ -14238,10 +12985,10 @@
       </p:grpSpPr>
       <p:sp>
         <p:nvSpPr>
-          <p:cNvPr id="16" name="Rectangle 15">
+          <p:cNvPr id="25" name="Rectangle 24">
             <a:extLst>
               <a:ext uri="{FF2B5EF4-FFF2-40B4-BE49-F238E27FC236}">
-                <a16:creationId xmlns:a16="http://schemas.microsoft.com/office/drawing/2014/main" id="{823AC064-BC96-4F32-8AE1-B2FD38754823}"/>
+                <a16:creationId xmlns:a16="http://schemas.microsoft.com/office/drawing/2014/main" id="{5E52985E-2553-471E-82AA-5ED7A329890A}"/>
               </a:ext>
               <a:ext uri="{C183D7F6-B498-43B3-948B-1728B52AA6E4}">
                 <adec:decorative xmlns:adec="http://schemas.microsoft.com/office/drawing/2017/decorative" val="1"/>
@@ -14261,18 +13008,24 @@
         </p:nvSpPr>
         <p:spPr bwMode="ltGray">
           <a:xfrm>
-            <a:off x="396882" y="280374"/>
+            <a:off x="393308" y="352931"/>
             <a:ext cx="11438793" cy="1844256"/>
           </a:xfrm>
           <a:prstGeom prst="rect">
             <a:avLst/>
           </a:prstGeom>
           <a:solidFill>
-            <a:srgbClr val="404040"/>
+            <a:schemeClr val="tx1">
+              <a:lumMod val="75000"/>
+              <a:lumOff val="25000"/>
+            </a:schemeClr>
           </a:solidFill>
           <a:ln w="127000" cap="sq" cmpd="thinThick">
             <a:solidFill>
-              <a:srgbClr val="404040"/>
+              <a:schemeClr val="tx1">
+                <a:lumMod val="75000"/>
+                <a:lumOff val="25000"/>
+              </a:schemeClr>
             </a:solidFill>
           </a:ln>
         </p:spPr>
@@ -14296,8 +13049,37 @@
           <a:bodyPr rtlCol="0" anchor="ctr"/>
           <a:lstStyle/>
           <a:p>
-            <a:pPr algn="ctr"/>
-            <a:endParaRPr lang="en-US"/>
+            <a:pPr marL="0" marR="0" lvl="0" indent="0" algn="ctr" defTabSz="914400" rtl="0" eaLnBrk="1" fontAlgn="auto" latinLnBrk="0" hangingPunct="1">
+              <a:lnSpc>
+                <a:spcPct val="100000"/>
+              </a:lnSpc>
+              <a:spcBef>
+                <a:spcPts val="0"/>
+              </a:spcBef>
+              <a:spcAft>
+                <a:spcPts val="0"/>
+              </a:spcAft>
+              <a:buClrTx/>
+              <a:buSzTx/>
+              <a:buFontTx/>
+              <a:buNone/>
+              <a:tabLst/>
+              <a:defRPr/>
+            </a:pPr>
+            <a:endParaRPr kumimoji="0" lang="en-US" sz="1800" b="0" i="0" u="none" strike="noStrike" kern="1200" cap="none" spc="0" normalizeH="0" baseline="0" noProof="0">
+              <a:ln>
+                <a:noFill/>
+              </a:ln>
+              <a:solidFill>
+                <a:prstClr val="white"/>
+              </a:solidFill>
+              <a:effectLst/>
+              <a:uLnTx/>
+              <a:uFillTx/>
+              <a:latin typeface="Calibri" panose="020F0502020204030204"/>
+              <a:ea typeface="+mn-ea"/>
+              <a:cs typeface="+mn-cs"/>
+            </a:endParaRPr>
           </a:p>
         </p:txBody>
       </p:sp>
@@ -14319,21 +13101,21 @@
         </p:nvSpPr>
         <p:spPr>
           <a:xfrm>
-            <a:off x="546351" y="433545"/>
-            <a:ext cx="11139854" cy="930447"/>
+            <a:off x="649270" y="506727"/>
+            <a:ext cx="3885141" cy="1526741"/>
           </a:xfrm>
         </p:spPr>
         <p:txBody>
-          <a:bodyPr vert="horz" lIns="91440" tIns="45720" rIns="91440" bIns="45720" rtlCol="0" anchor="b">
+          <a:bodyPr vert="horz" lIns="91440" tIns="45720" rIns="91440" bIns="45720" rtlCol="0" anchor="ctr">
             <a:normAutofit/>
           </a:bodyPr>
           <a:lstStyle/>
           <a:p>
-            <a:pPr algn="ctr"/>
+            <a:pPr algn="r"/>
             <a:r>
-              <a:rPr lang="en-US" sz="5400" dirty="0">
+              <a:rPr lang="en-US" sz="3000">
                 <a:solidFill>
-                  <a:srgbClr val="FFFFFF"/>
+                  <a:schemeClr val="bg1"/>
                 </a:solidFill>
               </a:rPr>
               <a:t>Bike type distribution</a:t>
@@ -14343,10 +13125,10 @@
       </p:sp>
       <p:cxnSp>
         <p:nvCxnSpPr>
-          <p:cNvPr id="18" name="Straight Connector 17">
+          <p:cNvPr id="27" name="Straight Connector 26">
             <a:extLst>
               <a:ext uri="{FF2B5EF4-FFF2-40B4-BE49-F238E27FC236}">
-                <a16:creationId xmlns:a16="http://schemas.microsoft.com/office/drawing/2014/main" id="{7E7C77BC-7138-40B1-A15B-20F57A494629}"/>
+                <a16:creationId xmlns:a16="http://schemas.microsoft.com/office/drawing/2014/main" id="{DAE3ABC6-4042-4293-A7DF-F01181363B7E}"/>
               </a:ext>
               <a:ext uri="{C183D7F6-B498-43B3-948B-1728B52AA6E4}">
                 <adec:decorative xmlns:adec="http://schemas.microsoft.com/office/drawing/2017/decorative" val="1"/>
@@ -14365,16 +13147,18 @@
           </p:nvPr>
         </p:nvCxnSpPr>
         <p:spPr>
-          <a:xfrm>
-            <a:off x="2230078" y="1522292"/>
-            <a:ext cx="7772400" cy="0"/>
+          <a:xfrm flipV="1">
+            <a:off x="4739873" y="580963"/>
+            <a:ext cx="0" cy="1371600"/>
           </a:xfrm>
           <a:prstGeom prst="line">
             <a:avLst/>
           </a:prstGeom>
-          <a:ln w="22225">
+          <a:ln w="19050">
             <a:solidFill>
-              <a:srgbClr val="D9D9D9"/>
+              <a:schemeClr val="bg1">
+                <a:alpha val="75000"/>
+              </a:schemeClr>
             </a:solidFill>
           </a:ln>
         </p:spPr>
@@ -14393,58 +13177,84 @@
           </a:fontRef>
         </p:style>
       </p:cxnSp>
-      <p:cxnSp>
-        <p:nvCxnSpPr>
-          <p:cNvPr id="20" name="Straight Connector 19">
+      <p:sp>
+        <p:nvSpPr>
+          <p:cNvPr id="3" name="TextBox 2">
             <a:extLst>
               <a:ext uri="{FF2B5EF4-FFF2-40B4-BE49-F238E27FC236}">
-                <a16:creationId xmlns:a16="http://schemas.microsoft.com/office/drawing/2014/main" id="{DB146403-F3D6-484B-B2ED-97F9565D0370}"/>
-              </a:ext>
-              <a:ext uri="{C183D7F6-B498-43B3-948B-1728B52AA6E4}">
-                <adec:decorative xmlns:adec="http://schemas.microsoft.com/office/drawing/2017/decorative" val="1"/>
+                <a16:creationId xmlns:a16="http://schemas.microsoft.com/office/drawing/2014/main" id="{F63F12AA-8BF8-497F-8F0F-E9BA1ADE3B05}"/>
               </a:ext>
             </a:extLst>
           </p:cNvPr>
-          <p:cNvCxnSpPr>
-            <a:cxnSpLocks noGrp="1" noRot="1" noChangeAspect="1" noMove="1" noResize="1" noEditPoints="1" noAdjustHandles="1" noChangeArrowheads="1" noChangeShapeType="1"/>
-          </p:cNvCxnSpPr>
-          <p:nvPr>
-            <p:extLst>
-              <p:ext uri="{386F3935-93C4-4BCD-93E2-E3B085C9AB24}">
-                <p16:designElem xmlns:p16="http://schemas.microsoft.com/office/powerpoint/2015/main" val="1"/>
-              </p:ext>
-            </p:extLst>
-          </p:nvPr>
-        </p:nvCxnSpPr>
+          <p:cNvSpPr txBox="1"/>
+          <p:nvPr/>
+        </p:nvSpPr>
         <p:spPr>
           <a:xfrm>
-            <a:off x="6116278" y="2596836"/>
-            <a:ext cx="0" cy="3657600"/>
+            <a:off x="4945336" y="506727"/>
+            <a:ext cx="6609921" cy="1526741"/>
           </a:xfrm>
-          <a:prstGeom prst="line">
+          <a:prstGeom prst="rect">
             <a:avLst/>
           </a:prstGeom>
-          <a:ln w="101600" cmpd="dbl">
-            <a:solidFill>
-              <a:srgbClr val="595959"/>
-            </a:solidFill>
-          </a:ln>
         </p:spPr>
-        <p:style>
-          <a:lnRef idx="1">
-            <a:schemeClr val="accent1"/>
-          </a:lnRef>
-          <a:fillRef idx="0">
-            <a:schemeClr val="accent1"/>
-          </a:fillRef>
-          <a:effectRef idx="0">
-            <a:schemeClr val="accent1"/>
-          </a:effectRef>
-          <a:fontRef idx="minor">
-            <a:schemeClr val="tx1"/>
-          </a:fontRef>
-        </p:style>
-      </p:cxnSp>
+        <p:txBody>
+          <a:bodyPr rot="0" spcFirstLastPara="0" vertOverflow="overflow" horzOverflow="overflow" vert="horz" lIns="91440" tIns="45720" rIns="91440" bIns="45720" numCol="1" spcCol="0" rtlCol="0" fromWordArt="0" anchor="ctr" anchorCtr="0" forceAA="0" compatLnSpc="1">
+            <a:prstTxWarp prst="textNoShape">
+              <a:avLst/>
+            </a:prstTxWarp>
+            <a:normAutofit/>
+          </a:bodyPr>
+          <a:lstStyle/>
+          <a:p>
+            <a:pPr indent="-228600">
+              <a:lnSpc>
+                <a:spcPct val="90000"/>
+              </a:lnSpc>
+              <a:spcAft>
+                <a:spcPts val="600"/>
+              </a:spcAft>
+              <a:buFont typeface="Arial" panose="020B0604020202020204" pitchFamily="34" charset="0"/>
+              <a:buChar char="•"/>
+            </a:pPr>
+            <a:r>
+              <a:rPr lang="en-US" sz="2200" dirty="0">
+                <a:solidFill>
+                  <a:schemeClr val="bg1"/>
+                </a:solidFill>
+              </a:rPr>
+              <a:t>Some casual bikers choose docked bike because it is easier to see and find a docking station around the city.</a:t>
+            </a:r>
+            <a:endParaRPr lang="en-US" sz="2200" dirty="0">
+              <a:solidFill>
+                <a:schemeClr val="bg1"/>
+              </a:solidFill>
+              <a:cs typeface="Calibri"/>
+            </a:endParaRPr>
+          </a:p>
+          <a:p>
+            <a:pPr indent="-228600">
+              <a:lnSpc>
+                <a:spcPct val="90000"/>
+              </a:lnSpc>
+              <a:spcAft>
+                <a:spcPts val="600"/>
+              </a:spcAft>
+              <a:buFont typeface="Arial" panose="020B0604020202020204" pitchFamily="34" charset="0"/>
+              <a:buChar char="•"/>
+            </a:pPr>
+            <a:r>
+              <a:rPr lang="en-US" sz="2200" dirty="0">
+                <a:solidFill>
+                  <a:schemeClr val="bg1"/>
+                </a:solidFill>
+                <a:cs typeface="Calibri"/>
+              </a:rPr>
+              <a:t>There is a higher average electric bike usage by casual bikers due to it being easier to travel than a classic bike.</a:t>
+            </a:r>
+          </a:p>
+        </p:txBody>
+      </p:sp>
       <p:pic>
         <p:nvPicPr>
           <p:cNvPr id="6" name="Picture 5" descr="Timeline&#10;&#10;Description automatically generated">
@@ -14473,8 +13283,8 @@
         </p:blipFill>
         <p:spPr>
           <a:xfrm>
-            <a:off x="6210871" y="2277800"/>
-            <a:ext cx="5715798" cy="4299823"/>
+            <a:off x="495162" y="2523915"/>
+            <a:ext cx="5355772" cy="3749040"/>
           </a:xfrm>
           <a:prstGeom prst="rect">
             <a:avLst/>
@@ -14509,8 +13319,8 @@
         </p:blipFill>
         <p:spPr>
           <a:xfrm>
-            <a:off x="265331" y="2253377"/>
-            <a:ext cx="5715798" cy="4299823"/>
+            <a:off x="6347327" y="2527997"/>
+            <a:ext cx="5355772" cy="3749040"/>
           </a:xfrm>
           <a:prstGeom prst="rect">
             <a:avLst/>

</xml_diff>